<commit_message>
Latest discovery with issues on project board
</commit_message>
<xml_diff>
--- a/Process.pptx
+++ b/Process.pptx
@@ -1306,6 +1306,42 @@
         </a:p>
       </dgm:t>
     </dgm:pt>
+    <dgm:pt modelId="{86BC58EA-79A5-4058-B184-844A44BE1FE6}">
+      <dgm:prSet phldrT="[Text]"/>
+      <dgm:spPr/>
+      <dgm:t>
+        <a:bodyPr/>
+        <a:lstStyle/>
+        <a:p>
+          <a:r>
+            <a:rPr lang="en-US" b="1" dirty="0"/>
+            <a:t>Strainer</a:t>
+          </a:r>
+        </a:p>
+      </dgm:t>
+    </dgm:pt>
+    <dgm:pt modelId="{F7ABC74E-C73C-413B-9688-54A88AD28ACA}" type="parTrans" cxnId="{541E9168-6C25-4287-A915-AA8A3C51D0FF}">
+      <dgm:prSet/>
+      <dgm:spPr/>
+      <dgm:t>
+        <a:bodyPr/>
+        <a:lstStyle/>
+        <a:p>
+          <a:endParaRPr lang="en-US"/>
+        </a:p>
+      </dgm:t>
+    </dgm:pt>
+    <dgm:pt modelId="{4D6B8210-E46F-4E00-9E13-9E87CAFC86FE}" type="sibTrans" cxnId="{541E9168-6C25-4287-A915-AA8A3C51D0FF}">
+      <dgm:prSet/>
+      <dgm:spPr/>
+      <dgm:t>
+        <a:bodyPr/>
+        <a:lstStyle/>
+        <a:p>
+          <a:endParaRPr lang="en-US"/>
+        </a:p>
+      </dgm:t>
+    </dgm:pt>
     <dgm:pt modelId="{067DA208-1061-4547-8697-F053152A5C89}" type="pres">
       <dgm:prSet presAssocID="{616CA420-8EC5-4E0F-AFD9-4C81D706DB16}" presName="hierChild1" presStyleCnt="0">
         <dgm:presLayoutVars>
@@ -1483,8 +1519,40 @@
       <dgm:prSet presAssocID="{86C64116-287E-4E94-9F73-0B51D21BECDC}" presName="hierChild2" presStyleCnt="0"/>
       <dgm:spPr/>
     </dgm:pt>
+    <dgm:pt modelId="{372E3FD4-20ED-4245-A5B7-8D451A740EF6}" type="pres">
+      <dgm:prSet presAssocID="{F7ABC74E-C73C-413B-9688-54A88AD28ACA}" presName="Name37" presStyleLbl="parChTrans1D2" presStyleIdx="2" presStyleCnt="5"/>
+      <dgm:spPr/>
+    </dgm:pt>
+    <dgm:pt modelId="{4D74D111-E382-469B-B8E6-0F0BDCBBFBFC}" type="pres">
+      <dgm:prSet presAssocID="{86BC58EA-79A5-4058-B184-844A44BE1FE6}" presName="hierRoot2" presStyleCnt="0">
+        <dgm:presLayoutVars>
+          <dgm:hierBranch val="init"/>
+        </dgm:presLayoutVars>
+      </dgm:prSet>
+      <dgm:spPr/>
+    </dgm:pt>
+    <dgm:pt modelId="{3E330E29-8D33-4075-B8FE-F5C70AC4A637}" type="pres">
+      <dgm:prSet presAssocID="{86BC58EA-79A5-4058-B184-844A44BE1FE6}" presName="rootComposite" presStyleCnt="0"/>
+      <dgm:spPr/>
+    </dgm:pt>
+    <dgm:pt modelId="{034FA45F-AE35-4F9E-B7AE-D58AC0DDD34B}" type="pres">
+      <dgm:prSet presAssocID="{86BC58EA-79A5-4058-B184-844A44BE1FE6}" presName="rootText" presStyleLbl="node2" presStyleIdx="2" presStyleCnt="5">
+        <dgm:presLayoutVars>
+          <dgm:chPref val="3"/>
+        </dgm:presLayoutVars>
+      </dgm:prSet>
+      <dgm:spPr/>
+    </dgm:pt>
+    <dgm:pt modelId="{B49B46E6-FDFA-4152-83FC-1D0AC493C455}" type="pres">
+      <dgm:prSet presAssocID="{86BC58EA-79A5-4058-B184-844A44BE1FE6}" presName="rootConnector" presStyleLbl="node2" presStyleIdx="2" presStyleCnt="5"/>
+      <dgm:spPr/>
+    </dgm:pt>
+    <dgm:pt modelId="{44ADBA6B-2AA9-4645-A6EC-C74A253FAF67}" type="pres">
+      <dgm:prSet presAssocID="{86BC58EA-79A5-4058-B184-844A44BE1FE6}" presName="hierChild4" presStyleCnt="0"/>
+      <dgm:spPr/>
+    </dgm:pt>
     <dgm:pt modelId="{E323F981-40CC-4366-A300-F1899878B388}" type="pres">
-      <dgm:prSet presAssocID="{8658F3A3-2873-4CAA-8333-F8DA60DE7A11}" presName="Name37" presStyleLbl="parChTrans1D2" presStyleIdx="2" presStyleCnt="5"/>
+      <dgm:prSet presAssocID="{8658F3A3-2873-4CAA-8333-F8DA60DE7A11}" presName="Name37" presStyleLbl="parChTrans1D3" presStyleIdx="0" presStyleCnt="1"/>
       <dgm:spPr/>
     </dgm:pt>
     <dgm:pt modelId="{7D422051-BFBF-4058-9A16-8A56786434F7}" type="pres">
@@ -1500,7 +1568,7 @@
       <dgm:spPr/>
     </dgm:pt>
     <dgm:pt modelId="{86BD5765-A2F6-48A1-B7F5-45B15109904D}" type="pres">
-      <dgm:prSet presAssocID="{8AF6693A-3749-4D6B-A8C7-B0912D99E1B9}" presName="rootText" presStyleLbl="node2" presStyleIdx="2" presStyleCnt="5">
+      <dgm:prSet presAssocID="{8AF6693A-3749-4D6B-A8C7-B0912D99E1B9}" presName="rootText" presStyleLbl="node3" presStyleIdx="0" presStyleCnt="1">
         <dgm:presLayoutVars>
           <dgm:chPref val="3"/>
         </dgm:presLayoutVars>
@@ -1508,7 +1576,7 @@
       <dgm:spPr/>
     </dgm:pt>
     <dgm:pt modelId="{F1DA370A-EE12-4218-A4EF-7AC9934D9605}" type="pres">
-      <dgm:prSet presAssocID="{8AF6693A-3749-4D6B-A8C7-B0912D99E1B9}" presName="rootConnector" presStyleLbl="node2" presStyleIdx="2" presStyleCnt="5"/>
+      <dgm:prSet presAssocID="{8AF6693A-3749-4D6B-A8C7-B0912D99E1B9}" presName="rootConnector" presStyleLbl="node3" presStyleIdx="0" presStyleCnt="1"/>
       <dgm:spPr/>
     </dgm:pt>
     <dgm:pt modelId="{06737C39-0C39-4750-8FB0-8D4490604DAC}" type="pres">
@@ -1516,7 +1584,7 @@
       <dgm:spPr/>
     </dgm:pt>
     <dgm:pt modelId="{D096FC42-6D01-4166-97D4-5BDFFC3A29A5}" type="pres">
-      <dgm:prSet presAssocID="{97FBB66B-24D6-457E-98C2-6AE3CED2D718}" presName="Name37" presStyleLbl="parChTrans1D3" presStyleIdx="0" presStyleCnt="2"/>
+      <dgm:prSet presAssocID="{97FBB66B-24D6-457E-98C2-6AE3CED2D718}" presName="Name37" presStyleLbl="parChTrans1D4" presStyleIdx="0" presStyleCnt="2"/>
       <dgm:spPr/>
     </dgm:pt>
     <dgm:pt modelId="{1C89D89A-9090-468E-A85D-A55099160B33}" type="pres">
@@ -1532,7 +1600,7 @@
       <dgm:spPr/>
     </dgm:pt>
     <dgm:pt modelId="{62AF5118-178A-4A2E-AB5F-87CEC64655D8}" type="pres">
-      <dgm:prSet presAssocID="{D2F0C754-95E7-4AB2-AE74-67DA48782C33}" presName="rootText" presStyleLbl="node3" presStyleIdx="0" presStyleCnt="2">
+      <dgm:prSet presAssocID="{D2F0C754-95E7-4AB2-AE74-67DA48782C33}" presName="rootText" presStyleLbl="node4" presStyleIdx="0" presStyleCnt="2">
         <dgm:presLayoutVars>
           <dgm:chPref val="3"/>
         </dgm:presLayoutVars>
@@ -1540,7 +1608,7 @@
       <dgm:spPr/>
     </dgm:pt>
     <dgm:pt modelId="{2D2AC7A6-D8C5-4FCA-93CD-79FBEE89A75F}" type="pres">
-      <dgm:prSet presAssocID="{D2F0C754-95E7-4AB2-AE74-67DA48782C33}" presName="rootConnector" presStyleLbl="node3" presStyleIdx="0" presStyleCnt="2"/>
+      <dgm:prSet presAssocID="{D2F0C754-95E7-4AB2-AE74-67DA48782C33}" presName="rootConnector" presStyleLbl="node4" presStyleIdx="0" presStyleCnt="2"/>
       <dgm:spPr/>
     </dgm:pt>
     <dgm:pt modelId="{25D366B1-48EB-4E86-9D5A-3086D90C95BF}" type="pres">
@@ -1552,7 +1620,7 @@
       <dgm:spPr/>
     </dgm:pt>
     <dgm:pt modelId="{42AAC22F-D576-43F5-9D95-8FC2D2EB16B1}" type="pres">
-      <dgm:prSet presAssocID="{F28E7894-4C49-4D6B-AAD4-261BFD601D2B}" presName="Name37" presStyleLbl="parChTrans1D3" presStyleIdx="1" presStyleCnt="2"/>
+      <dgm:prSet presAssocID="{F28E7894-4C49-4D6B-AAD4-261BFD601D2B}" presName="Name37" presStyleLbl="parChTrans1D4" presStyleIdx="1" presStyleCnt="2"/>
       <dgm:spPr/>
     </dgm:pt>
     <dgm:pt modelId="{2CA31727-7428-4C97-BFCD-E954AF3E1ABE}" type="pres">
@@ -1568,7 +1636,7 @@
       <dgm:spPr/>
     </dgm:pt>
     <dgm:pt modelId="{9E0BECA6-6FDD-492A-B2E9-D33DD043F84D}" type="pres">
-      <dgm:prSet presAssocID="{68F0EFBE-28D1-40A4-B9FE-BDF1C71D522A}" presName="rootText" presStyleLbl="node3" presStyleIdx="1" presStyleCnt="2">
+      <dgm:prSet presAssocID="{68F0EFBE-28D1-40A4-B9FE-BDF1C71D522A}" presName="rootText" presStyleLbl="node4" presStyleIdx="1" presStyleCnt="2">
         <dgm:presLayoutVars>
           <dgm:chPref val="3"/>
         </dgm:presLayoutVars>
@@ -1576,7 +1644,7 @@
       <dgm:spPr/>
     </dgm:pt>
     <dgm:pt modelId="{FAFE7A5A-8B2A-40A9-8B95-1C87CBF7C09F}" type="pres">
-      <dgm:prSet presAssocID="{68F0EFBE-28D1-40A4-B9FE-BDF1C71D522A}" presName="rootConnector" presStyleLbl="node3" presStyleIdx="1" presStyleCnt="2"/>
+      <dgm:prSet presAssocID="{68F0EFBE-28D1-40A4-B9FE-BDF1C71D522A}" presName="rootConnector" presStyleLbl="node4" presStyleIdx="1" presStyleCnt="2"/>
       <dgm:spPr/>
     </dgm:pt>
     <dgm:pt modelId="{5C3BC1AE-6970-4CF8-83B8-A2545A96C77B}" type="pres">
@@ -1589,6 +1657,10 @@
     </dgm:pt>
     <dgm:pt modelId="{67D76246-9DF8-4798-B500-1F1DBC1FEEE4}" type="pres">
       <dgm:prSet presAssocID="{8AF6693A-3749-4D6B-A8C7-B0912D99E1B9}" presName="hierChild5" presStyleCnt="0"/>
+      <dgm:spPr/>
+    </dgm:pt>
+    <dgm:pt modelId="{ABC976D1-305A-406D-AA8F-827BBA561509}" type="pres">
+      <dgm:prSet presAssocID="{86BC58EA-79A5-4058-B184-844A44BE1FE6}" presName="hierChild5" presStyleCnt="0"/>
       <dgm:spPr/>
     </dgm:pt>
     <dgm:pt modelId="{55150A5B-0AF3-4CC9-8896-3ED0875A19B2}" type="pres">
@@ -1702,8 +1774,6 @@
   </dgm:ptLst>
   <dgm:cxnLst>
     <dgm:cxn modelId="{6B1EB005-CB08-45F4-B512-A3B521D98579}" type="presOf" srcId="{16BFFB6A-AD51-4FD3-A9F8-7BEE1B18A871}" destId="{FF43F8E2-7D14-4CF4-AF47-BE6F6B2EA88A}" srcOrd="0" destOrd="0" presId="urn:microsoft.com/office/officeart/2005/8/layout/orgChart1"/>
-    <dgm:cxn modelId="{7F957913-AFAE-4572-AA5E-39ECF319E81C}" type="presOf" srcId="{68F0EFBE-28D1-40A4-B9FE-BDF1C71D522A}" destId="{FAFE7A5A-8B2A-40A9-8B95-1C87CBF7C09F}" srcOrd="1" destOrd="0" presId="urn:microsoft.com/office/officeart/2005/8/layout/orgChart1"/>
-    <dgm:cxn modelId="{CD20D715-3544-46B5-A730-AA24D79ED5D2}" type="presOf" srcId="{D2F0C754-95E7-4AB2-AE74-67DA48782C33}" destId="{62AF5118-178A-4A2E-AB5F-87CEC64655D8}" srcOrd="0" destOrd="0" presId="urn:microsoft.com/office/officeart/2005/8/layout/orgChart1"/>
     <dgm:cxn modelId="{50886E26-4518-42D0-83EE-F5A8D746849F}" srcId="{8AF6693A-3749-4D6B-A8C7-B0912D99E1B9}" destId="{68F0EFBE-28D1-40A4-B9FE-BDF1C71D522A}" srcOrd="1" destOrd="0" parTransId="{F28E7894-4C49-4D6B-AAD4-261BFD601D2B}" sibTransId="{5E856FB3-5764-479B-A057-59758E5BEDB9}"/>
     <dgm:cxn modelId="{0A5CBE2A-0F5E-49E5-AC57-F94115BFE3AA}" srcId="{8AF6693A-3749-4D6B-A8C7-B0912D99E1B9}" destId="{D2F0C754-95E7-4AB2-AE74-67DA48782C33}" srcOrd="0" destOrd="0" parTransId="{97FBB66B-24D6-457E-98C2-6AE3CED2D718}" sibTransId="{D1F2EFD3-1B9F-4BAD-A7B3-1C5502D24E5C}"/>
     <dgm:cxn modelId="{B109CC2E-817C-41D1-B1BF-CABE2E0CE0B0}" srcId="{616CA420-8EC5-4E0F-AFD9-4C81D706DB16}" destId="{07F130EF-660A-4695-9553-ED89322A5C8A}" srcOrd="0" destOrd="0" parTransId="{F7FB8D10-52C6-46E9-8F70-78269C2F23CA}" sibTransId="{0A229086-2F81-44D0-957C-66072610FAE4}"/>
@@ -1713,35 +1783,41 @@
     <dgm:cxn modelId="{5D8B005B-EC93-42DF-A176-536C5C8D673C}" srcId="{616CA420-8EC5-4E0F-AFD9-4C81D706DB16}" destId="{13DB4C17-C0E6-4415-AFEF-980ABC2564FC}" srcOrd="3" destOrd="0" parTransId="{17F0A8F9-5EEB-4B23-93DD-0851AEC4ED2A}" sibTransId="{8CF22AE9-7C7A-407C-8E44-023746ADB2C6}"/>
     <dgm:cxn modelId="{FEA38541-0DA2-45A7-BB59-3EE678F57091}" type="presOf" srcId="{4679CC91-BB9C-4BA3-B55B-F7EAE6CEF877}" destId="{65938371-8F79-4B9F-A992-0E6CDC0ED4C3}" srcOrd="0" destOrd="0" presId="urn:microsoft.com/office/officeart/2005/8/layout/orgChart1"/>
     <dgm:cxn modelId="{21C24763-360F-45CA-8CC5-8963E48E1D9A}" srcId="{588E680F-35B8-48CC-A63F-71D7D5C88F8B}" destId="{4679CC91-BB9C-4BA3-B55B-F7EAE6CEF877}" srcOrd="0" destOrd="0" parTransId="{E94E1178-2C06-4300-87D5-FBF0A2463F2F}" sibTransId="{EEE37F86-E3F0-4DB3-A177-16E199CD0CEB}"/>
-    <dgm:cxn modelId="{C9A32C64-B774-4CBF-9569-A4961E98601C}" type="presOf" srcId="{8AF6693A-3749-4D6B-A8C7-B0912D99E1B9}" destId="{F1DA370A-EE12-4218-A4EF-7AC9934D9605}" srcOrd="1" destOrd="0" presId="urn:microsoft.com/office/officeart/2005/8/layout/orgChart1"/>
     <dgm:cxn modelId="{F552A467-6FDB-4B3B-B3D1-BCAEC7F12A8D}" type="presOf" srcId="{616CA420-8EC5-4E0F-AFD9-4C81D706DB16}" destId="{067DA208-1061-4547-8697-F053152A5C89}" srcOrd="0" destOrd="0" presId="urn:microsoft.com/office/officeart/2005/8/layout/orgChart1"/>
     <dgm:cxn modelId="{F6FDF467-FD4F-4846-A9F9-BFA67952083F}" type="presOf" srcId="{4679CC91-BB9C-4BA3-B55B-F7EAE6CEF877}" destId="{9B802EA1-D0A8-401D-BC1B-F5BE9A2F8428}" srcOrd="1" destOrd="0" presId="urn:microsoft.com/office/officeart/2005/8/layout/orgChart1"/>
+    <dgm:cxn modelId="{541E9168-6C25-4287-A915-AA8A3C51D0FF}" srcId="{86C64116-287E-4E94-9F73-0B51D21BECDC}" destId="{86BC58EA-79A5-4058-B184-844A44BE1FE6}" srcOrd="0" destOrd="0" parTransId="{F7ABC74E-C73C-413B-9688-54A88AD28ACA}" sibTransId="{4D6B8210-E46F-4E00-9E13-9E87CAFC86FE}"/>
+    <dgm:cxn modelId="{177B536D-4D1B-405A-A901-B0F7422E201B}" type="presOf" srcId="{68F0EFBE-28D1-40A4-B9FE-BDF1C71D522A}" destId="{9E0BECA6-6FDD-492A-B2E9-D33DD043F84D}" srcOrd="0" destOrd="0" presId="urn:microsoft.com/office/officeart/2005/8/layout/orgChart1"/>
+    <dgm:cxn modelId="{08FF4B72-2566-4D96-8728-5BFFE86E9B07}" type="presOf" srcId="{D2F0C754-95E7-4AB2-AE74-67DA48782C33}" destId="{62AF5118-178A-4A2E-AB5F-87CEC64655D8}" srcOrd="0" destOrd="0" presId="urn:microsoft.com/office/officeart/2005/8/layout/orgChart1"/>
     <dgm:cxn modelId="{7EC76E72-7E76-46CF-9E01-B5F497DCB033}" type="presOf" srcId="{232AC8D6-9A28-4BCE-91D9-924B9B01E85A}" destId="{472C4FA7-2A62-4D2B-9BA0-5177280A9E4D}" srcOrd="0" destOrd="0" presId="urn:microsoft.com/office/officeart/2005/8/layout/orgChart1"/>
     <dgm:cxn modelId="{258D1453-32AE-4635-AE35-E7BA7B71237C}" type="presOf" srcId="{588E680F-35B8-48CC-A63F-71D7D5C88F8B}" destId="{8D02329B-13C3-4A92-98AE-CAD412B29AA4}" srcOrd="1" destOrd="0" presId="urn:microsoft.com/office/officeart/2005/8/layout/orgChart1"/>
-    <dgm:cxn modelId="{9AB73C53-9144-4EAE-A783-429D7FCC97D2}" type="presOf" srcId="{3DD26A04-BA0A-4D85-AB0D-30567548B39A}" destId="{3816A5CC-BEB8-48EC-81BF-8E885B64C6DD}" srcOrd="0" destOrd="0" presId="urn:microsoft.com/office/officeart/2005/8/layout/orgChart1"/>
+    <dgm:cxn modelId="{D814E853-056A-4475-AF13-A9A3CF77D430}" type="presOf" srcId="{79542134-E7F1-495E-A5D7-14AAA5EAECA6}" destId="{55150A5B-0AF3-4CC9-8896-3ED0875A19B2}" srcOrd="0" destOrd="0" presId="urn:microsoft.com/office/officeart/2005/8/layout/orgChart1"/>
     <dgm:cxn modelId="{DBFE8C55-61D3-460C-B086-978CAB317E88}" type="presOf" srcId="{07F130EF-660A-4695-9553-ED89322A5C8A}" destId="{E83E2CCC-1D46-4C05-B48B-38E6A7A3B46A}" srcOrd="0" destOrd="0" presId="urn:microsoft.com/office/officeart/2005/8/layout/orgChart1"/>
-    <dgm:cxn modelId="{0C350A78-D0B9-4E06-8A3E-D811E3FC10A9}" type="presOf" srcId="{3DD26A04-BA0A-4D85-AB0D-30567548B39A}" destId="{842A9112-1AC6-4B32-9ACD-982378971DCA}" srcOrd="1" destOrd="0" presId="urn:microsoft.com/office/officeart/2005/8/layout/orgChart1"/>
+    <dgm:cxn modelId="{2EAC5E76-9D6A-478C-94BC-DD146FF4312F}" type="presOf" srcId="{86BC58EA-79A5-4058-B184-844A44BE1FE6}" destId="{034FA45F-AE35-4F9E-B7AE-D58AC0DDD34B}" srcOrd="0" destOrd="0" presId="urn:microsoft.com/office/officeart/2005/8/layout/orgChart1"/>
+    <dgm:cxn modelId="{B2124B79-4728-4144-B669-AC835E03CA53}" type="presOf" srcId="{D2F0C754-95E7-4AB2-AE74-67DA48782C33}" destId="{2D2AC7A6-D8C5-4FCA-93CD-79FBEE89A75F}" srcOrd="1" destOrd="0" presId="urn:microsoft.com/office/officeart/2005/8/layout/orgChart1"/>
     <dgm:cxn modelId="{85AE657F-4314-442F-AC50-6126B1097B53}" srcId="{86C64116-287E-4E94-9F73-0B51D21BECDC}" destId="{3DD26A04-BA0A-4D85-AB0D-30567548B39A}" srcOrd="1" destOrd="0" parTransId="{79542134-E7F1-495E-A5D7-14AAA5EAECA6}" sibTransId="{0B058FB8-8CDA-48AC-AFE2-BF03E69E1CE0}"/>
     <dgm:cxn modelId="{0FEF0780-672E-420E-AB5B-3D2A48CFFF6E}" type="presOf" srcId="{86C64116-287E-4E94-9F73-0B51D21BECDC}" destId="{1235F484-90B6-423F-83EB-9AD63B06E949}" srcOrd="1" destOrd="0" presId="urn:microsoft.com/office/officeart/2005/8/layout/orgChart1"/>
     <dgm:cxn modelId="{59BF2583-3FB2-43D3-946B-3F5566AF4AE5}" srcId="{616CA420-8EC5-4E0F-AFD9-4C81D706DB16}" destId="{588E680F-35B8-48CC-A63F-71D7D5C88F8B}" srcOrd="1" destOrd="0" parTransId="{618DD69F-8017-4836-BD99-D21FB42EABAE}" sibTransId="{C5061F5E-F4E0-46CB-BEBA-15E4551EA4B5}"/>
-    <dgm:cxn modelId="{C3B9488A-0D14-42A7-95FB-4C77E67ECF52}" type="presOf" srcId="{D2F0C754-95E7-4AB2-AE74-67DA48782C33}" destId="{2D2AC7A6-D8C5-4FCA-93CD-79FBEE89A75F}" srcOrd="1" destOrd="0" presId="urn:microsoft.com/office/officeart/2005/8/layout/orgChart1"/>
     <dgm:cxn modelId="{8A03E98B-F492-424F-A3DC-BE359F0A9402}" srcId="{13DB4C17-C0E6-4415-AFEF-980ABC2564FC}" destId="{5F6DD0AC-511C-496F-A838-EBCC6C317675}" srcOrd="0" destOrd="0" parTransId="{F6CC6B34-2BB2-4EF3-AB82-1BE7E5655D97}" sibTransId="{88F451B8-B197-4B30-B821-CC685360C99D}"/>
     <dgm:cxn modelId="{CF1FA58D-6970-4426-B6FC-14695F45DB73}" type="presOf" srcId="{5F6DD0AC-511C-496F-A838-EBCC6C317675}" destId="{DE1AE636-A532-4298-AC12-335967E92665}" srcOrd="0" destOrd="0" presId="urn:microsoft.com/office/officeart/2005/8/layout/orgChart1"/>
-    <dgm:cxn modelId="{BF5EC19B-768C-46B7-B86D-6C432856056D}" type="presOf" srcId="{68F0EFBE-28D1-40A4-B9FE-BDF1C71D522A}" destId="{9E0BECA6-6FDD-492A-B2E9-D33DD043F84D}" srcOrd="0" destOrd="0" presId="urn:microsoft.com/office/officeart/2005/8/layout/orgChart1"/>
+    <dgm:cxn modelId="{DD0C8393-4EE6-462E-B628-CD1814D96280}" type="presOf" srcId="{86BC58EA-79A5-4058-B184-844A44BE1FE6}" destId="{B49B46E6-FDFA-4152-83FC-1D0AC493C455}" srcOrd="1" destOrd="0" presId="urn:microsoft.com/office/officeart/2005/8/layout/orgChart1"/>
     <dgm:cxn modelId="{D5811BA1-9A51-4A2F-83ED-E7AEAFE03A6C}" srcId="{07F130EF-660A-4695-9553-ED89322A5C8A}" destId="{232AC8D6-9A28-4BCE-91D9-924B9B01E85A}" srcOrd="0" destOrd="0" parTransId="{16BFFB6A-AD51-4FD3-A9F8-7BEE1B18A871}" sibTransId="{21A15C10-4689-4C64-8061-CAE226579A0D}"/>
-    <dgm:cxn modelId="{BC79E7A4-D03B-433E-931E-41AE3B8A2A00}" type="presOf" srcId="{F28E7894-4C49-4D6B-AAD4-261BFD601D2B}" destId="{42AAC22F-D576-43F5-9D95-8FC2D2EB16B1}" srcOrd="0" destOrd="0" presId="urn:microsoft.com/office/officeart/2005/8/layout/orgChart1"/>
+    <dgm:cxn modelId="{8C62EDAD-4C43-4D99-A641-F9A4ED3AB660}" type="presOf" srcId="{8AF6693A-3749-4D6B-A8C7-B0912D99E1B9}" destId="{86BD5765-A2F6-48A1-B7F5-45B15109904D}" srcOrd="0" destOrd="0" presId="urn:microsoft.com/office/officeart/2005/8/layout/orgChart1"/>
+    <dgm:cxn modelId="{DF52DBB1-EA99-4468-9ED4-9FFBD62B1025}" type="presOf" srcId="{97FBB66B-24D6-457E-98C2-6AE3CED2D718}" destId="{D096FC42-6D01-4166-97D4-5BDFFC3A29A5}" srcOrd="0" destOrd="0" presId="urn:microsoft.com/office/officeart/2005/8/layout/orgChart1"/>
+    <dgm:cxn modelId="{92F9A3B2-6959-4D08-BA69-828EA54321D0}" type="presOf" srcId="{8AF6693A-3749-4D6B-A8C7-B0912D99E1B9}" destId="{F1DA370A-EE12-4218-A4EF-7AC9934D9605}" srcOrd="1" destOrd="0" presId="urn:microsoft.com/office/officeart/2005/8/layout/orgChart1"/>
     <dgm:cxn modelId="{36C7F3B3-36E4-453B-B6B2-A2134895EBC6}" type="presOf" srcId="{13DB4C17-C0E6-4415-AFEF-980ABC2564FC}" destId="{E49F3485-8B07-4666-9706-942325754F7F}" srcOrd="0" destOrd="0" presId="urn:microsoft.com/office/officeart/2005/8/layout/orgChart1"/>
-    <dgm:cxn modelId="{9DD38EB7-1804-4CD2-AAFE-33DC5E1D6663}" type="presOf" srcId="{8658F3A3-2873-4CAA-8333-F8DA60DE7A11}" destId="{E323F981-40CC-4366-A300-F1899878B388}" srcOrd="0" destOrd="0" presId="urn:microsoft.com/office/officeart/2005/8/layout/orgChart1"/>
     <dgm:cxn modelId="{43D615BF-5442-4599-BCC9-9D50CDE45653}" srcId="{616CA420-8EC5-4E0F-AFD9-4C81D706DB16}" destId="{86C64116-287E-4E94-9F73-0B51D21BECDC}" srcOrd="2" destOrd="0" parTransId="{1B2F78C5-139D-4606-AF3E-0F8F7F03B4CB}" sibTransId="{FB19ED7A-DCCF-44AA-9E0C-3795A7D74CC8}"/>
-    <dgm:cxn modelId="{D4DBFEC7-0FA8-42E5-899A-34F79588E541}" type="presOf" srcId="{79542134-E7F1-495E-A5D7-14AAA5EAECA6}" destId="{55150A5B-0AF3-4CC9-8896-3ED0875A19B2}" srcOrd="0" destOrd="0" presId="urn:microsoft.com/office/officeart/2005/8/layout/orgChart1"/>
+    <dgm:cxn modelId="{CB9485BF-D6EE-4F16-A4CD-7AD6E06AB11A}" type="presOf" srcId="{F28E7894-4C49-4D6B-AAD4-261BFD601D2B}" destId="{42AAC22F-D576-43F5-9D95-8FC2D2EB16B1}" srcOrd="0" destOrd="0" presId="urn:microsoft.com/office/officeart/2005/8/layout/orgChart1"/>
     <dgm:cxn modelId="{B1779DCF-7C94-4AD6-801D-2C847E057607}" type="presOf" srcId="{07F130EF-660A-4695-9553-ED89322A5C8A}" destId="{8E3E36EB-93DA-42B9-8AE4-5AAEADB0783D}" srcOrd="1" destOrd="0" presId="urn:microsoft.com/office/officeart/2005/8/layout/orgChart1"/>
     <dgm:cxn modelId="{4E4039D5-5148-4901-A637-6F2B970916F3}" type="presOf" srcId="{E94E1178-2C06-4300-87D5-FBF0A2463F2F}" destId="{770546ED-6F78-4D9E-BDF0-3CEF8C85229C}" srcOrd="0" destOrd="0" presId="urn:microsoft.com/office/officeart/2005/8/layout/orgChart1"/>
     <dgm:cxn modelId="{5563B6D5-4705-4AB3-940D-57D205CC6BA4}" type="presOf" srcId="{F6CC6B34-2BB2-4EF3-AB82-1BE7E5655D97}" destId="{6080B5F3-5840-4AA4-91E5-F6FE015E37E0}" srcOrd="0" destOrd="0" presId="urn:microsoft.com/office/officeart/2005/8/layout/orgChart1"/>
-    <dgm:cxn modelId="{58AB8FD9-E370-4AC6-90D6-96C8C871FCE6}" srcId="{86C64116-287E-4E94-9F73-0B51D21BECDC}" destId="{8AF6693A-3749-4D6B-A8C7-B0912D99E1B9}" srcOrd="0" destOrd="0" parTransId="{8658F3A3-2873-4CAA-8333-F8DA60DE7A11}" sibTransId="{14952E70-04A0-44A0-A3EF-4466B736998C}"/>
-    <dgm:cxn modelId="{A508DDD9-22F2-485B-8092-A44C4B51174F}" type="presOf" srcId="{97FBB66B-24D6-457E-98C2-6AE3CED2D718}" destId="{D096FC42-6D01-4166-97D4-5BDFFC3A29A5}" srcOrd="0" destOrd="0" presId="urn:microsoft.com/office/officeart/2005/8/layout/orgChart1"/>
+    <dgm:cxn modelId="{58AB8FD9-E370-4AC6-90D6-96C8C871FCE6}" srcId="{86BC58EA-79A5-4058-B184-844A44BE1FE6}" destId="{8AF6693A-3749-4D6B-A8C7-B0912D99E1B9}" srcOrd="0" destOrd="0" parTransId="{8658F3A3-2873-4CAA-8333-F8DA60DE7A11}" sibTransId="{14952E70-04A0-44A0-A3EF-4466B736998C}"/>
+    <dgm:cxn modelId="{7AC986DB-86C4-499A-8CD3-09CAD70B607F}" type="presOf" srcId="{68F0EFBE-28D1-40A4-B9FE-BDF1C71D522A}" destId="{FAFE7A5A-8B2A-40A9-8B95-1C87CBF7C09F}" srcOrd="1" destOrd="0" presId="urn:microsoft.com/office/officeart/2005/8/layout/orgChart1"/>
     <dgm:cxn modelId="{44E0CBE8-FED1-4592-A5CB-45EDF2CFFC77}" type="presOf" srcId="{13DB4C17-C0E6-4415-AFEF-980ABC2564FC}" destId="{708203DA-F022-4A8A-9660-479CA3D9C2DF}" srcOrd="1" destOrd="0" presId="urn:microsoft.com/office/officeart/2005/8/layout/orgChart1"/>
+    <dgm:cxn modelId="{D8294FEC-2632-4725-B8D9-D96D59568191}" type="presOf" srcId="{8658F3A3-2873-4CAA-8333-F8DA60DE7A11}" destId="{E323F981-40CC-4366-A300-F1899878B388}" srcOrd="0" destOrd="0" presId="urn:microsoft.com/office/officeart/2005/8/layout/orgChart1"/>
+    <dgm:cxn modelId="{4BE38CF1-2F6C-4A63-A9F3-8028531EF953}" type="presOf" srcId="{3DD26A04-BA0A-4D85-AB0D-30567548B39A}" destId="{842A9112-1AC6-4B32-9ACD-982378971DCA}" srcOrd="1" destOrd="0" presId="urn:microsoft.com/office/officeart/2005/8/layout/orgChart1"/>
     <dgm:cxn modelId="{3E1E58F3-A4A5-4716-A536-792C436A9E36}" type="presOf" srcId="{5F6DD0AC-511C-496F-A838-EBCC6C317675}" destId="{0A1A26E5-4FF8-426E-A826-7D0694C38E0D}" srcOrd="1" destOrd="0" presId="urn:microsoft.com/office/officeart/2005/8/layout/orgChart1"/>
-    <dgm:cxn modelId="{FD8C6BFA-705C-4B49-8151-5832F12AB244}" type="presOf" srcId="{8AF6693A-3749-4D6B-A8C7-B0912D99E1B9}" destId="{86BD5765-A2F6-48A1-B7F5-45B15109904D}" srcOrd="0" destOrd="0" presId="urn:microsoft.com/office/officeart/2005/8/layout/orgChart1"/>
+    <dgm:cxn modelId="{DB41E3F4-C9DC-43FE-B5E5-CCB5D19BBB7F}" type="presOf" srcId="{3DD26A04-BA0A-4D85-AB0D-30567548B39A}" destId="{3816A5CC-BEB8-48EC-81BF-8E885B64C6DD}" srcOrd="0" destOrd="0" presId="urn:microsoft.com/office/officeart/2005/8/layout/orgChart1"/>
+    <dgm:cxn modelId="{C0CF24F9-AF43-4860-BC8B-F8FA9208B44D}" type="presOf" srcId="{F7ABC74E-C73C-413B-9688-54A88AD28ACA}" destId="{372E3FD4-20ED-4245-A5B7-8D451A740EF6}" srcOrd="0" destOrd="0" presId="urn:microsoft.com/office/officeart/2005/8/layout/orgChart1"/>
     <dgm:cxn modelId="{CEA7E3E1-F318-452B-8EE6-1552C7137D97}" type="presParOf" srcId="{067DA208-1061-4547-8697-F053152A5C89}" destId="{42A43A0C-C673-4E6F-B026-BA72880DD7C7}" srcOrd="0" destOrd="0" presId="urn:microsoft.com/office/officeart/2005/8/layout/orgChart1"/>
     <dgm:cxn modelId="{4F36A5B3-5BA0-44ED-93F3-44A1F4BAA218}" type="presParOf" srcId="{42A43A0C-C673-4E6F-B026-BA72880DD7C7}" destId="{76A78C18-1791-4F4F-A7F6-DCA810B8A636}" srcOrd="0" destOrd="0" presId="urn:microsoft.com/office/officeart/2005/8/layout/orgChart1"/>
     <dgm:cxn modelId="{439DC25E-5B42-4E95-9012-1C94BC7263DF}" type="presParOf" srcId="{76A78C18-1791-4F4F-A7F6-DCA810B8A636}" destId="{E83E2CCC-1D46-4C05-B48B-38E6A7A3B46A}" srcOrd="0" destOrd="0" presId="urn:microsoft.com/office/officeart/2005/8/layout/orgChart1"/>
@@ -1773,34 +1849,41 @@
     <dgm:cxn modelId="{3C796680-2B0F-4C9A-9D4D-F306F348F5A3}" type="presParOf" srcId="{466BA5C9-063A-4400-BF60-0DFAAD5702BF}" destId="{76337CE2-C862-4456-B13C-F7EA8DD019F5}" srcOrd="0" destOrd="0" presId="urn:microsoft.com/office/officeart/2005/8/layout/orgChart1"/>
     <dgm:cxn modelId="{3D90FE21-DD51-4B7F-8504-41EB03557A50}" type="presParOf" srcId="{466BA5C9-063A-4400-BF60-0DFAAD5702BF}" destId="{1235F484-90B6-423F-83EB-9AD63B06E949}" srcOrd="1" destOrd="0" presId="urn:microsoft.com/office/officeart/2005/8/layout/orgChart1"/>
     <dgm:cxn modelId="{DAC727BE-1D29-4130-9D29-9371AD23EF4F}" type="presParOf" srcId="{3C2E3AB0-C351-43D8-BC19-5329CBB03393}" destId="{FFEE239A-88F9-492C-BB63-5A5DFDC2F40B}" srcOrd="1" destOrd="0" presId="urn:microsoft.com/office/officeart/2005/8/layout/orgChart1"/>
-    <dgm:cxn modelId="{1F0B74C5-DDF2-412A-96CF-383FE5C48B91}" type="presParOf" srcId="{FFEE239A-88F9-492C-BB63-5A5DFDC2F40B}" destId="{E323F981-40CC-4366-A300-F1899878B388}" srcOrd="0" destOrd="0" presId="urn:microsoft.com/office/officeart/2005/8/layout/orgChart1"/>
-    <dgm:cxn modelId="{BF82120B-9FE1-4D4E-B085-D519D48A911B}" type="presParOf" srcId="{FFEE239A-88F9-492C-BB63-5A5DFDC2F40B}" destId="{7D422051-BFBF-4058-9A16-8A56786434F7}" srcOrd="1" destOrd="0" presId="urn:microsoft.com/office/officeart/2005/8/layout/orgChart1"/>
-    <dgm:cxn modelId="{74938E7A-472B-4BC1-93BA-7E3DBD5EB482}" type="presParOf" srcId="{7D422051-BFBF-4058-9A16-8A56786434F7}" destId="{D636FADB-A632-43A4-83EC-1D3CBE566D5D}" srcOrd="0" destOrd="0" presId="urn:microsoft.com/office/officeart/2005/8/layout/orgChart1"/>
-    <dgm:cxn modelId="{15DF685C-B2CE-4193-9D51-6E7BE3BC84F1}" type="presParOf" srcId="{D636FADB-A632-43A4-83EC-1D3CBE566D5D}" destId="{86BD5765-A2F6-48A1-B7F5-45B15109904D}" srcOrd="0" destOrd="0" presId="urn:microsoft.com/office/officeart/2005/8/layout/orgChart1"/>
-    <dgm:cxn modelId="{593F73D7-1032-4C80-9EB0-22B4122B259D}" type="presParOf" srcId="{D636FADB-A632-43A4-83EC-1D3CBE566D5D}" destId="{F1DA370A-EE12-4218-A4EF-7AC9934D9605}" srcOrd="1" destOrd="0" presId="urn:microsoft.com/office/officeart/2005/8/layout/orgChart1"/>
-    <dgm:cxn modelId="{DA947AE9-A86C-4FE4-B5B7-D74272E2E6A2}" type="presParOf" srcId="{7D422051-BFBF-4058-9A16-8A56786434F7}" destId="{06737C39-0C39-4750-8FB0-8D4490604DAC}" srcOrd="1" destOrd="0" presId="urn:microsoft.com/office/officeart/2005/8/layout/orgChart1"/>
-    <dgm:cxn modelId="{6BB86933-5FF2-4CDF-9AD8-BDE3D7C738C7}" type="presParOf" srcId="{06737C39-0C39-4750-8FB0-8D4490604DAC}" destId="{D096FC42-6D01-4166-97D4-5BDFFC3A29A5}" srcOrd="0" destOrd="0" presId="urn:microsoft.com/office/officeart/2005/8/layout/orgChart1"/>
-    <dgm:cxn modelId="{9CF925B4-79F1-4C7B-91EE-EB921AE1E929}" type="presParOf" srcId="{06737C39-0C39-4750-8FB0-8D4490604DAC}" destId="{1C89D89A-9090-468E-A85D-A55099160B33}" srcOrd="1" destOrd="0" presId="urn:microsoft.com/office/officeart/2005/8/layout/orgChart1"/>
-    <dgm:cxn modelId="{22FAD8E3-EFFC-4204-8821-E689E8B41E24}" type="presParOf" srcId="{1C89D89A-9090-468E-A85D-A55099160B33}" destId="{EA6F1F4B-45B6-414A-BEC0-C11A4712E627}" srcOrd="0" destOrd="0" presId="urn:microsoft.com/office/officeart/2005/8/layout/orgChart1"/>
-    <dgm:cxn modelId="{C9B13B2F-54AB-40B5-BE2F-425EF3D14908}" type="presParOf" srcId="{EA6F1F4B-45B6-414A-BEC0-C11A4712E627}" destId="{62AF5118-178A-4A2E-AB5F-87CEC64655D8}" srcOrd="0" destOrd="0" presId="urn:microsoft.com/office/officeart/2005/8/layout/orgChart1"/>
-    <dgm:cxn modelId="{968C2DC0-8E55-4398-BE4D-5AC59AF17651}" type="presParOf" srcId="{EA6F1F4B-45B6-414A-BEC0-C11A4712E627}" destId="{2D2AC7A6-D8C5-4FCA-93CD-79FBEE89A75F}" srcOrd="1" destOrd="0" presId="urn:microsoft.com/office/officeart/2005/8/layout/orgChart1"/>
-    <dgm:cxn modelId="{5B927351-BC17-44EB-B6EF-2E9D1CCD540E}" type="presParOf" srcId="{1C89D89A-9090-468E-A85D-A55099160B33}" destId="{25D366B1-48EB-4E86-9D5A-3086D90C95BF}" srcOrd="1" destOrd="0" presId="urn:microsoft.com/office/officeart/2005/8/layout/orgChart1"/>
-    <dgm:cxn modelId="{5BAFCEC0-4199-4DB4-9985-BC76EBAA8781}" type="presParOf" srcId="{1C89D89A-9090-468E-A85D-A55099160B33}" destId="{88A3F8A6-E704-486A-9701-15EF634E2AAA}" srcOrd="2" destOrd="0" presId="urn:microsoft.com/office/officeart/2005/8/layout/orgChart1"/>
-    <dgm:cxn modelId="{C0E58550-AB8B-4069-90D2-683729AD0847}" type="presParOf" srcId="{06737C39-0C39-4750-8FB0-8D4490604DAC}" destId="{42AAC22F-D576-43F5-9D95-8FC2D2EB16B1}" srcOrd="2" destOrd="0" presId="urn:microsoft.com/office/officeart/2005/8/layout/orgChart1"/>
-    <dgm:cxn modelId="{E68D62F6-85D9-413B-925D-6DE2EDDDDBD3}" type="presParOf" srcId="{06737C39-0C39-4750-8FB0-8D4490604DAC}" destId="{2CA31727-7428-4C97-BFCD-E954AF3E1ABE}" srcOrd="3" destOrd="0" presId="urn:microsoft.com/office/officeart/2005/8/layout/orgChart1"/>
-    <dgm:cxn modelId="{8606EF2D-5055-4324-8875-CAB5AD9FE168}" type="presParOf" srcId="{2CA31727-7428-4C97-BFCD-E954AF3E1ABE}" destId="{B2B6C7A6-48AE-436E-BFAC-7F8E22224764}" srcOrd="0" destOrd="0" presId="urn:microsoft.com/office/officeart/2005/8/layout/orgChart1"/>
-    <dgm:cxn modelId="{E5BEEF99-AB7E-4517-90D8-19A06119D9E3}" type="presParOf" srcId="{B2B6C7A6-48AE-436E-BFAC-7F8E22224764}" destId="{9E0BECA6-6FDD-492A-B2E9-D33DD043F84D}" srcOrd="0" destOrd="0" presId="urn:microsoft.com/office/officeart/2005/8/layout/orgChart1"/>
-    <dgm:cxn modelId="{D3389CAE-5D2A-492D-A613-3FCA9C4C4BE1}" type="presParOf" srcId="{B2B6C7A6-48AE-436E-BFAC-7F8E22224764}" destId="{FAFE7A5A-8B2A-40A9-8B95-1C87CBF7C09F}" srcOrd="1" destOrd="0" presId="urn:microsoft.com/office/officeart/2005/8/layout/orgChart1"/>
-    <dgm:cxn modelId="{57E84685-F1EB-4EBD-9BF7-BC2026B0D200}" type="presParOf" srcId="{2CA31727-7428-4C97-BFCD-E954AF3E1ABE}" destId="{5C3BC1AE-6970-4CF8-83B8-A2545A96C77B}" srcOrd="1" destOrd="0" presId="urn:microsoft.com/office/officeart/2005/8/layout/orgChart1"/>
-    <dgm:cxn modelId="{67DBCF96-4726-4924-8D7A-3582494A1323}" type="presParOf" srcId="{2CA31727-7428-4C97-BFCD-E954AF3E1ABE}" destId="{FB59F509-53AA-413E-A322-FD57B0304E6C}" srcOrd="2" destOrd="0" presId="urn:microsoft.com/office/officeart/2005/8/layout/orgChart1"/>
-    <dgm:cxn modelId="{94F01380-7DB0-4F16-B8DC-EB04D4AE1ADD}" type="presParOf" srcId="{7D422051-BFBF-4058-9A16-8A56786434F7}" destId="{67D76246-9DF8-4798-B500-1F1DBC1FEEE4}" srcOrd="2" destOrd="0" presId="urn:microsoft.com/office/officeart/2005/8/layout/orgChart1"/>
-    <dgm:cxn modelId="{67B28A14-D857-4A70-953D-3F12D823A5F4}" type="presParOf" srcId="{FFEE239A-88F9-492C-BB63-5A5DFDC2F40B}" destId="{55150A5B-0AF3-4CC9-8896-3ED0875A19B2}" srcOrd="2" destOrd="0" presId="urn:microsoft.com/office/officeart/2005/8/layout/orgChart1"/>
-    <dgm:cxn modelId="{18082017-C5B7-4F5A-ADFB-FFC7F4B13566}" type="presParOf" srcId="{FFEE239A-88F9-492C-BB63-5A5DFDC2F40B}" destId="{351D058D-74BA-454F-AE5C-9F6B1BA791A1}" srcOrd="3" destOrd="0" presId="urn:microsoft.com/office/officeart/2005/8/layout/orgChart1"/>
-    <dgm:cxn modelId="{8FCD36FF-89E3-4878-9C0E-E29A8B5B6544}" type="presParOf" srcId="{351D058D-74BA-454F-AE5C-9F6B1BA791A1}" destId="{E31B64DF-7BF2-4B15-A53F-E1AA143839FB}" srcOrd="0" destOrd="0" presId="urn:microsoft.com/office/officeart/2005/8/layout/orgChart1"/>
-    <dgm:cxn modelId="{6803EF94-E502-44FE-ADCF-4A0D53C43287}" type="presParOf" srcId="{E31B64DF-7BF2-4B15-A53F-E1AA143839FB}" destId="{3816A5CC-BEB8-48EC-81BF-8E885B64C6DD}" srcOrd="0" destOrd="0" presId="urn:microsoft.com/office/officeart/2005/8/layout/orgChart1"/>
-    <dgm:cxn modelId="{D8B0105F-1B12-44EB-A74F-073508EB8403}" type="presParOf" srcId="{E31B64DF-7BF2-4B15-A53F-E1AA143839FB}" destId="{842A9112-1AC6-4B32-9ACD-982378971DCA}" srcOrd="1" destOrd="0" presId="urn:microsoft.com/office/officeart/2005/8/layout/orgChart1"/>
-    <dgm:cxn modelId="{CF513C55-9963-4539-BD6C-C1E1BA99EA84}" type="presParOf" srcId="{351D058D-74BA-454F-AE5C-9F6B1BA791A1}" destId="{B8C6151D-5EE3-4D77-93A1-27307E3E50BE}" srcOrd="1" destOrd="0" presId="urn:microsoft.com/office/officeart/2005/8/layout/orgChart1"/>
-    <dgm:cxn modelId="{F93EDA96-9FF7-4F74-8EA0-9FB3954161D4}" type="presParOf" srcId="{351D058D-74BA-454F-AE5C-9F6B1BA791A1}" destId="{0A3B31A7-8149-477D-AEFC-F41B3FDD88CE}" srcOrd="2" destOrd="0" presId="urn:microsoft.com/office/officeart/2005/8/layout/orgChart1"/>
+    <dgm:cxn modelId="{22E53E01-E620-49E8-A9A3-E6059C84C8AF}" type="presParOf" srcId="{FFEE239A-88F9-492C-BB63-5A5DFDC2F40B}" destId="{372E3FD4-20ED-4245-A5B7-8D451A740EF6}" srcOrd="0" destOrd="0" presId="urn:microsoft.com/office/officeart/2005/8/layout/orgChart1"/>
+    <dgm:cxn modelId="{A966F229-73FB-4786-9144-A5EE7F38A535}" type="presParOf" srcId="{FFEE239A-88F9-492C-BB63-5A5DFDC2F40B}" destId="{4D74D111-E382-469B-B8E6-0F0BDCBBFBFC}" srcOrd="1" destOrd="0" presId="urn:microsoft.com/office/officeart/2005/8/layout/orgChart1"/>
+    <dgm:cxn modelId="{8498F855-962F-4325-BF2E-36C294039B57}" type="presParOf" srcId="{4D74D111-E382-469B-B8E6-0F0BDCBBFBFC}" destId="{3E330E29-8D33-4075-B8FE-F5C70AC4A637}" srcOrd="0" destOrd="0" presId="urn:microsoft.com/office/officeart/2005/8/layout/orgChart1"/>
+    <dgm:cxn modelId="{3A0B048F-66D3-4D02-83C4-636402B39E39}" type="presParOf" srcId="{3E330E29-8D33-4075-B8FE-F5C70AC4A637}" destId="{034FA45F-AE35-4F9E-B7AE-D58AC0DDD34B}" srcOrd="0" destOrd="0" presId="urn:microsoft.com/office/officeart/2005/8/layout/orgChart1"/>
+    <dgm:cxn modelId="{DD312853-AA73-433C-B380-7BD3EB4785E8}" type="presParOf" srcId="{3E330E29-8D33-4075-B8FE-F5C70AC4A637}" destId="{B49B46E6-FDFA-4152-83FC-1D0AC493C455}" srcOrd="1" destOrd="0" presId="urn:microsoft.com/office/officeart/2005/8/layout/orgChart1"/>
+    <dgm:cxn modelId="{AE9004DE-05F0-4E35-854A-B186CD8D5868}" type="presParOf" srcId="{4D74D111-E382-469B-B8E6-0F0BDCBBFBFC}" destId="{44ADBA6B-2AA9-4645-A6EC-C74A253FAF67}" srcOrd="1" destOrd="0" presId="urn:microsoft.com/office/officeart/2005/8/layout/orgChart1"/>
+    <dgm:cxn modelId="{8A23A483-78DC-490A-8259-D19D15572A28}" type="presParOf" srcId="{44ADBA6B-2AA9-4645-A6EC-C74A253FAF67}" destId="{E323F981-40CC-4366-A300-F1899878B388}" srcOrd="0" destOrd="0" presId="urn:microsoft.com/office/officeart/2005/8/layout/orgChart1"/>
+    <dgm:cxn modelId="{37B32E42-D5E2-455D-B1ED-727E18E340AD}" type="presParOf" srcId="{44ADBA6B-2AA9-4645-A6EC-C74A253FAF67}" destId="{7D422051-BFBF-4058-9A16-8A56786434F7}" srcOrd="1" destOrd="0" presId="urn:microsoft.com/office/officeart/2005/8/layout/orgChart1"/>
+    <dgm:cxn modelId="{99B0406B-B56D-47F8-A2FB-755EF1B6EDC6}" type="presParOf" srcId="{7D422051-BFBF-4058-9A16-8A56786434F7}" destId="{D636FADB-A632-43A4-83EC-1D3CBE566D5D}" srcOrd="0" destOrd="0" presId="urn:microsoft.com/office/officeart/2005/8/layout/orgChart1"/>
+    <dgm:cxn modelId="{0D61FE3D-8EC6-4662-8E39-E7E6AF7A26C9}" type="presParOf" srcId="{D636FADB-A632-43A4-83EC-1D3CBE566D5D}" destId="{86BD5765-A2F6-48A1-B7F5-45B15109904D}" srcOrd="0" destOrd="0" presId="urn:microsoft.com/office/officeart/2005/8/layout/orgChart1"/>
+    <dgm:cxn modelId="{92D5DFEE-B5CC-451D-AFCE-1B3D078381E9}" type="presParOf" srcId="{D636FADB-A632-43A4-83EC-1D3CBE566D5D}" destId="{F1DA370A-EE12-4218-A4EF-7AC9934D9605}" srcOrd="1" destOrd="0" presId="urn:microsoft.com/office/officeart/2005/8/layout/orgChart1"/>
+    <dgm:cxn modelId="{5FA9BDBB-15C0-4BD3-8B67-A99E195F3AFB}" type="presParOf" srcId="{7D422051-BFBF-4058-9A16-8A56786434F7}" destId="{06737C39-0C39-4750-8FB0-8D4490604DAC}" srcOrd="1" destOrd="0" presId="urn:microsoft.com/office/officeart/2005/8/layout/orgChart1"/>
+    <dgm:cxn modelId="{159E8A7B-DE54-411C-AAB6-30DB051443EE}" type="presParOf" srcId="{06737C39-0C39-4750-8FB0-8D4490604DAC}" destId="{D096FC42-6D01-4166-97D4-5BDFFC3A29A5}" srcOrd="0" destOrd="0" presId="urn:microsoft.com/office/officeart/2005/8/layout/orgChart1"/>
+    <dgm:cxn modelId="{FBA17389-6953-4156-A96A-047E5627BC8B}" type="presParOf" srcId="{06737C39-0C39-4750-8FB0-8D4490604DAC}" destId="{1C89D89A-9090-468E-A85D-A55099160B33}" srcOrd="1" destOrd="0" presId="urn:microsoft.com/office/officeart/2005/8/layout/orgChart1"/>
+    <dgm:cxn modelId="{4DECB64F-8C32-42EA-8936-2E2686B1EB49}" type="presParOf" srcId="{1C89D89A-9090-468E-A85D-A55099160B33}" destId="{EA6F1F4B-45B6-414A-BEC0-C11A4712E627}" srcOrd="0" destOrd="0" presId="urn:microsoft.com/office/officeart/2005/8/layout/orgChart1"/>
+    <dgm:cxn modelId="{0788CE65-F20C-4FC2-A2D5-981CA6236CA2}" type="presParOf" srcId="{EA6F1F4B-45B6-414A-BEC0-C11A4712E627}" destId="{62AF5118-178A-4A2E-AB5F-87CEC64655D8}" srcOrd="0" destOrd="0" presId="urn:microsoft.com/office/officeart/2005/8/layout/orgChart1"/>
+    <dgm:cxn modelId="{F2F3AD40-EF88-46FA-A9E7-4C1185DBB759}" type="presParOf" srcId="{EA6F1F4B-45B6-414A-BEC0-C11A4712E627}" destId="{2D2AC7A6-D8C5-4FCA-93CD-79FBEE89A75F}" srcOrd="1" destOrd="0" presId="urn:microsoft.com/office/officeart/2005/8/layout/orgChart1"/>
+    <dgm:cxn modelId="{A8CAA78D-5A9C-4794-8A32-7148A9BFBAE9}" type="presParOf" srcId="{1C89D89A-9090-468E-A85D-A55099160B33}" destId="{25D366B1-48EB-4E86-9D5A-3086D90C95BF}" srcOrd="1" destOrd="0" presId="urn:microsoft.com/office/officeart/2005/8/layout/orgChart1"/>
+    <dgm:cxn modelId="{51422D42-F461-4C19-BE1D-7C111B7643CB}" type="presParOf" srcId="{1C89D89A-9090-468E-A85D-A55099160B33}" destId="{88A3F8A6-E704-486A-9701-15EF634E2AAA}" srcOrd="2" destOrd="0" presId="urn:microsoft.com/office/officeart/2005/8/layout/orgChart1"/>
+    <dgm:cxn modelId="{AC4D28CE-1105-4C7B-B6DB-2C2B691B4425}" type="presParOf" srcId="{06737C39-0C39-4750-8FB0-8D4490604DAC}" destId="{42AAC22F-D576-43F5-9D95-8FC2D2EB16B1}" srcOrd="2" destOrd="0" presId="urn:microsoft.com/office/officeart/2005/8/layout/orgChart1"/>
+    <dgm:cxn modelId="{B91DAC9C-8D89-43E4-A04A-425279504934}" type="presParOf" srcId="{06737C39-0C39-4750-8FB0-8D4490604DAC}" destId="{2CA31727-7428-4C97-BFCD-E954AF3E1ABE}" srcOrd="3" destOrd="0" presId="urn:microsoft.com/office/officeart/2005/8/layout/orgChart1"/>
+    <dgm:cxn modelId="{34543B64-A725-46E4-9AE3-5D0E3358C1EF}" type="presParOf" srcId="{2CA31727-7428-4C97-BFCD-E954AF3E1ABE}" destId="{B2B6C7A6-48AE-436E-BFAC-7F8E22224764}" srcOrd="0" destOrd="0" presId="urn:microsoft.com/office/officeart/2005/8/layout/orgChart1"/>
+    <dgm:cxn modelId="{5DDD76B2-59F0-439A-B9A5-D1D7326A2A50}" type="presParOf" srcId="{B2B6C7A6-48AE-436E-BFAC-7F8E22224764}" destId="{9E0BECA6-6FDD-492A-B2E9-D33DD043F84D}" srcOrd="0" destOrd="0" presId="urn:microsoft.com/office/officeart/2005/8/layout/orgChart1"/>
+    <dgm:cxn modelId="{50317B3A-09B8-4C22-96B2-974EA5768ED8}" type="presParOf" srcId="{B2B6C7A6-48AE-436E-BFAC-7F8E22224764}" destId="{FAFE7A5A-8B2A-40A9-8B95-1C87CBF7C09F}" srcOrd="1" destOrd="0" presId="urn:microsoft.com/office/officeart/2005/8/layout/orgChart1"/>
+    <dgm:cxn modelId="{E4169D2F-BC1F-4466-9BE5-91BC11F83C31}" type="presParOf" srcId="{2CA31727-7428-4C97-BFCD-E954AF3E1ABE}" destId="{5C3BC1AE-6970-4CF8-83B8-A2545A96C77B}" srcOrd="1" destOrd="0" presId="urn:microsoft.com/office/officeart/2005/8/layout/orgChart1"/>
+    <dgm:cxn modelId="{FA5C74FD-7A03-4ED1-A720-21514B839637}" type="presParOf" srcId="{2CA31727-7428-4C97-BFCD-E954AF3E1ABE}" destId="{FB59F509-53AA-413E-A322-FD57B0304E6C}" srcOrd="2" destOrd="0" presId="urn:microsoft.com/office/officeart/2005/8/layout/orgChart1"/>
+    <dgm:cxn modelId="{0CB5631E-8704-409D-BD8F-7B209248287A}" type="presParOf" srcId="{7D422051-BFBF-4058-9A16-8A56786434F7}" destId="{67D76246-9DF8-4798-B500-1F1DBC1FEEE4}" srcOrd="2" destOrd="0" presId="urn:microsoft.com/office/officeart/2005/8/layout/orgChart1"/>
+    <dgm:cxn modelId="{4EC25033-D6C6-4643-B5CE-9E87E8075560}" type="presParOf" srcId="{4D74D111-E382-469B-B8E6-0F0BDCBBFBFC}" destId="{ABC976D1-305A-406D-AA8F-827BBA561509}" srcOrd="2" destOrd="0" presId="urn:microsoft.com/office/officeart/2005/8/layout/orgChart1"/>
+    <dgm:cxn modelId="{14E4E7CE-CCA6-408B-BB3F-4E01AD4FA018}" type="presParOf" srcId="{FFEE239A-88F9-492C-BB63-5A5DFDC2F40B}" destId="{55150A5B-0AF3-4CC9-8896-3ED0875A19B2}" srcOrd="2" destOrd="0" presId="urn:microsoft.com/office/officeart/2005/8/layout/orgChart1"/>
+    <dgm:cxn modelId="{15D03EBD-3B52-4AC1-91E6-26784F2756BF}" type="presParOf" srcId="{FFEE239A-88F9-492C-BB63-5A5DFDC2F40B}" destId="{351D058D-74BA-454F-AE5C-9F6B1BA791A1}" srcOrd="3" destOrd="0" presId="urn:microsoft.com/office/officeart/2005/8/layout/orgChart1"/>
+    <dgm:cxn modelId="{6E57A8F5-2E28-4CBF-925A-EEE28F86DD85}" type="presParOf" srcId="{351D058D-74BA-454F-AE5C-9F6B1BA791A1}" destId="{E31B64DF-7BF2-4B15-A53F-E1AA143839FB}" srcOrd="0" destOrd="0" presId="urn:microsoft.com/office/officeart/2005/8/layout/orgChart1"/>
+    <dgm:cxn modelId="{03C2C4DB-2061-4B1A-816F-7576284C7231}" type="presParOf" srcId="{E31B64DF-7BF2-4B15-A53F-E1AA143839FB}" destId="{3816A5CC-BEB8-48EC-81BF-8E885B64C6DD}" srcOrd="0" destOrd="0" presId="urn:microsoft.com/office/officeart/2005/8/layout/orgChart1"/>
+    <dgm:cxn modelId="{A9F643C1-951D-4E3A-9394-5800313C2A7C}" type="presParOf" srcId="{E31B64DF-7BF2-4B15-A53F-E1AA143839FB}" destId="{842A9112-1AC6-4B32-9ACD-982378971DCA}" srcOrd="1" destOrd="0" presId="urn:microsoft.com/office/officeart/2005/8/layout/orgChart1"/>
+    <dgm:cxn modelId="{4D034D36-0886-4F0E-9FD4-2E375281195A}" type="presParOf" srcId="{351D058D-74BA-454F-AE5C-9F6B1BA791A1}" destId="{B8C6151D-5EE3-4D77-93A1-27307E3E50BE}" srcOrd="1" destOrd="0" presId="urn:microsoft.com/office/officeart/2005/8/layout/orgChart1"/>
+    <dgm:cxn modelId="{69F97279-C652-48FB-B82F-1AFEA29A04AD}" type="presParOf" srcId="{351D058D-74BA-454F-AE5C-9F6B1BA791A1}" destId="{0A3B31A7-8149-477D-AEFC-F41B3FDD88CE}" srcOrd="2" destOrd="0" presId="urn:microsoft.com/office/officeart/2005/8/layout/orgChart1"/>
     <dgm:cxn modelId="{B4A74A01-E32D-4BCC-A483-209B84ED3705}" type="presParOf" srcId="{3C2E3AB0-C351-43D8-BC19-5329CBB03393}" destId="{59384E5F-6906-47A2-9428-169EBD47F173}" srcOrd="2" destOrd="0" presId="urn:microsoft.com/office/officeart/2005/8/layout/orgChart1"/>
     <dgm:cxn modelId="{5C77FC46-CE70-41E6-87BF-39FC7D62DFEA}" type="presParOf" srcId="{067DA208-1061-4547-8697-F053152A5C89}" destId="{03EA125F-D01C-4786-B28C-2F547DD55C04}" srcOrd="3" destOrd="0" presId="urn:microsoft.com/office/officeart/2005/8/layout/orgChart1"/>
     <dgm:cxn modelId="{0C166800-7A83-466F-9AD1-2EB94D2997DB}" type="presParOf" srcId="{03EA125F-D01C-4786-B28C-2F547DD55C04}" destId="{F6328A26-D787-4176-849D-EC1FD201CA8D}" srcOrd="0" destOrd="0" presId="urn:microsoft.com/office/officeart/2005/8/layout/orgChart1"/>
@@ -1841,8 +1924,8 @@
       </dsp:nvSpPr>
       <dsp:spPr>
         <a:xfrm>
-          <a:off x="7385813" y="919991"/>
-          <a:ext cx="91440" cy="292224"/>
+          <a:off x="6992634" y="616084"/>
+          <a:ext cx="91440" cy="258105"/>
         </a:xfrm>
         <a:custGeom>
           <a:avLst/>
@@ -1856,7 +1939,7 @@
                 <a:pt x="45720" y="0"/>
               </a:moveTo>
               <a:lnTo>
-                <a:pt x="45720" y="292224"/>
+                <a:pt x="45720" y="258105"/>
               </a:lnTo>
             </a:path>
           </a:pathLst>
@@ -1896,8 +1979,8 @@
       </dsp:nvSpPr>
       <dsp:spPr>
         <a:xfrm>
-          <a:off x="4905883" y="919991"/>
-          <a:ext cx="841883" cy="292224"/>
+          <a:off x="4807588" y="616084"/>
+          <a:ext cx="743588" cy="258105"/>
         </a:xfrm>
         <a:custGeom>
           <a:avLst/>
@@ -1911,13 +1994,13 @@
                 <a:pt x="0" y="0"/>
               </a:moveTo>
               <a:lnTo>
-                <a:pt x="0" y="146112"/>
+                <a:pt x="0" y="129052"/>
               </a:lnTo>
               <a:lnTo>
-                <a:pt x="841883" y="146112"/>
+                <a:pt x="743588" y="129052"/>
               </a:lnTo>
               <a:lnTo>
-                <a:pt x="841883" y="292224"/>
+                <a:pt x="743588" y="258105"/>
               </a:lnTo>
             </a:path>
           </a:pathLst>
@@ -1957,8 +2040,8 @@
       </dsp:nvSpPr>
       <dsp:spPr>
         <a:xfrm>
-          <a:off x="3507382" y="1907986"/>
-          <a:ext cx="208731" cy="1628105"/>
+          <a:off x="3572371" y="2361367"/>
+          <a:ext cx="184360" cy="1438014"/>
         </a:xfrm>
         <a:custGeom>
           <a:avLst/>
@@ -1972,10 +2055,123 @@
                 <a:pt x="0" y="0"/>
               </a:moveTo>
               <a:lnTo>
-                <a:pt x="0" y="1628105"/>
+                <a:pt x="0" y="1438014"/>
               </a:lnTo>
               <a:lnTo>
-                <a:pt x="208731" y="1628105"/>
+                <a:pt x="184360" y="1438014"/>
+              </a:lnTo>
+            </a:path>
+          </a:pathLst>
+        </a:custGeom>
+        <a:noFill/>
+        <a:ln w="12700" cap="flat" cmpd="sng" algn="ctr">
+          <a:solidFill>
+            <a:schemeClr val="accent1">
+              <a:hueOff val="0"/>
+              <a:satOff val="0"/>
+              <a:lumOff val="0"/>
+              <a:alphaOff val="0"/>
+            </a:schemeClr>
+          </a:solidFill>
+          <a:prstDash val="solid"/>
+          <a:miter lim="800000"/>
+        </a:ln>
+        <a:effectLst/>
+      </dsp:spPr>
+      <dsp:style>
+        <a:lnRef idx="2">
+          <a:scrgbClr r="0" g="0" b="0"/>
+        </a:lnRef>
+        <a:fillRef idx="0">
+          <a:scrgbClr r="0" g="0" b="0"/>
+        </a:fillRef>
+        <a:effectRef idx="0">
+          <a:scrgbClr r="0" g="0" b="0"/>
+        </a:effectRef>
+        <a:fontRef idx="minor"/>
+      </dsp:style>
+    </dsp:sp>
+    <dsp:sp modelId="{D096FC42-6D01-4166-97D4-5BDFFC3A29A5}">
+      <dsp:nvSpPr>
+        <dsp:cNvPr id="0" name=""/>
+        <dsp:cNvSpPr/>
+      </dsp:nvSpPr>
+      <dsp:spPr>
+        <a:xfrm>
+          <a:off x="3572371" y="2361367"/>
+          <a:ext cx="184360" cy="565373"/>
+        </a:xfrm>
+        <a:custGeom>
+          <a:avLst/>
+          <a:gdLst/>
+          <a:ahLst/>
+          <a:cxnLst/>
+          <a:rect l="0" t="0" r="0" b="0"/>
+          <a:pathLst>
+            <a:path>
+              <a:moveTo>
+                <a:pt x="0" y="0"/>
+              </a:moveTo>
+              <a:lnTo>
+                <a:pt x="0" y="565373"/>
+              </a:lnTo>
+              <a:lnTo>
+                <a:pt x="184360" y="565373"/>
+              </a:lnTo>
+            </a:path>
+          </a:pathLst>
+        </a:custGeom>
+        <a:noFill/>
+        <a:ln w="12700" cap="flat" cmpd="sng" algn="ctr">
+          <a:solidFill>
+            <a:schemeClr val="accent1">
+              <a:hueOff val="0"/>
+              <a:satOff val="0"/>
+              <a:lumOff val="0"/>
+              <a:alphaOff val="0"/>
+            </a:schemeClr>
+          </a:solidFill>
+          <a:prstDash val="solid"/>
+          <a:miter lim="800000"/>
+        </a:ln>
+        <a:effectLst/>
+      </dsp:spPr>
+      <dsp:style>
+        <a:lnRef idx="2">
+          <a:scrgbClr r="0" g="0" b="0"/>
+        </a:lnRef>
+        <a:fillRef idx="0">
+          <a:scrgbClr r="0" g="0" b="0"/>
+        </a:fillRef>
+        <a:effectRef idx="0">
+          <a:scrgbClr r="0" g="0" b="0"/>
+        </a:effectRef>
+        <a:fontRef idx="minor"/>
+      </dsp:style>
+    </dsp:sp>
+    <dsp:sp modelId="{E323F981-40CC-4366-A300-F1899878B388}">
+      <dsp:nvSpPr>
+        <dsp:cNvPr id="0" name=""/>
+        <dsp:cNvSpPr/>
+      </dsp:nvSpPr>
+      <dsp:spPr>
+        <a:xfrm>
+          <a:off x="4018280" y="1488725"/>
+          <a:ext cx="91440" cy="258105"/>
+        </a:xfrm>
+        <a:custGeom>
+          <a:avLst/>
+          <a:gdLst/>
+          <a:ahLst/>
+          <a:cxnLst/>
+          <a:rect l="0" t="0" r="0" b="0"/>
+          <a:pathLst>
+            <a:path>
+              <a:moveTo>
+                <a:pt x="45720" y="0"/>
+              </a:moveTo>
+              <a:lnTo>
+                <a:pt x="45720" y="258105"/>
               </a:lnTo>
             </a:path>
           </a:pathLst>
@@ -2008,15 +2204,15 @@
         <a:fontRef idx="minor"/>
       </dsp:style>
     </dsp:sp>
-    <dsp:sp modelId="{D096FC42-6D01-4166-97D4-5BDFFC3A29A5}">
+    <dsp:sp modelId="{372E3FD4-20ED-4245-A5B7-8D451A740EF6}">
       <dsp:nvSpPr>
         <dsp:cNvPr id="0" name=""/>
         <dsp:cNvSpPr/>
       </dsp:nvSpPr>
       <dsp:spPr>
         <a:xfrm>
-          <a:off x="3507382" y="1907986"/>
-          <a:ext cx="208731" cy="640109"/>
+          <a:off x="4064000" y="616084"/>
+          <a:ext cx="743588" cy="258105"/>
         </a:xfrm>
         <a:custGeom>
           <a:avLst/>
@@ -2027,74 +2223,16 @@
           <a:pathLst>
             <a:path>
               <a:moveTo>
-                <a:pt x="0" y="0"/>
+                <a:pt x="743588" y="0"/>
               </a:moveTo>
               <a:lnTo>
-                <a:pt x="0" y="640109"/>
+                <a:pt x="743588" y="129052"/>
               </a:lnTo>
               <a:lnTo>
-                <a:pt x="208731" y="640109"/>
-              </a:lnTo>
-            </a:path>
-          </a:pathLst>
-        </a:custGeom>
-        <a:noFill/>
-        <a:ln w="12700" cap="flat" cmpd="sng" algn="ctr">
-          <a:solidFill>
-            <a:schemeClr val="accent6">
-              <a:hueOff val="0"/>
-              <a:satOff val="0"/>
-              <a:lumOff val="0"/>
-              <a:alphaOff val="0"/>
-            </a:schemeClr>
-          </a:solidFill>
-          <a:prstDash val="solid"/>
-          <a:miter lim="800000"/>
-        </a:ln>
-        <a:effectLst/>
-      </dsp:spPr>
-      <dsp:style>
-        <a:lnRef idx="2">
-          <a:scrgbClr r="0" g="0" b="0"/>
-        </a:lnRef>
-        <a:fillRef idx="0">
-          <a:scrgbClr r="0" g="0" b="0"/>
-        </a:fillRef>
-        <a:effectRef idx="0">
-          <a:scrgbClr r="0" g="0" b="0"/>
-        </a:effectRef>
-        <a:fontRef idx="minor"/>
-      </dsp:style>
-    </dsp:sp>
-    <dsp:sp modelId="{E323F981-40CC-4366-A300-F1899878B388}">
-      <dsp:nvSpPr>
-        <dsp:cNvPr id="0" name=""/>
-        <dsp:cNvSpPr/>
-      </dsp:nvSpPr>
-      <dsp:spPr>
-        <a:xfrm>
-          <a:off x="4064000" y="919991"/>
-          <a:ext cx="841883" cy="292224"/>
-        </a:xfrm>
-        <a:custGeom>
-          <a:avLst/>
-          <a:gdLst/>
-          <a:ahLst/>
-          <a:cxnLst/>
-          <a:rect l="0" t="0" r="0" b="0"/>
-          <a:pathLst>
-            <a:path>
-              <a:moveTo>
-                <a:pt x="841883" y="0"/>
-              </a:moveTo>
-              <a:lnTo>
-                <a:pt x="841883" y="146112"/>
+                <a:pt x="0" y="129052"/>
               </a:lnTo>
               <a:lnTo>
-                <a:pt x="0" y="146112"/>
-              </a:lnTo>
-              <a:lnTo>
-                <a:pt x="0" y="292224"/>
+                <a:pt x="0" y="258105"/>
               </a:lnTo>
             </a:path>
           </a:pathLst>
@@ -2134,8 +2272,8 @@
       </dsp:nvSpPr>
       <dsp:spPr>
         <a:xfrm>
-          <a:off x="2334513" y="919991"/>
-          <a:ext cx="91440" cy="292224"/>
+          <a:off x="2531102" y="616084"/>
+          <a:ext cx="91440" cy="258105"/>
         </a:xfrm>
         <a:custGeom>
           <a:avLst/>
@@ -2149,7 +2287,7 @@
                 <a:pt x="45720" y="0"/>
               </a:moveTo>
               <a:lnTo>
-                <a:pt x="45720" y="292224"/>
+                <a:pt x="45720" y="258105"/>
               </a:lnTo>
             </a:path>
           </a:pathLst>
@@ -2189,8 +2327,8 @@
       </dsp:nvSpPr>
       <dsp:spPr>
         <a:xfrm>
-          <a:off x="650746" y="919991"/>
-          <a:ext cx="91440" cy="292224"/>
+          <a:off x="1043925" y="616084"/>
+          <a:ext cx="91440" cy="258105"/>
         </a:xfrm>
         <a:custGeom>
           <a:avLst/>
@@ -2204,7 +2342,7 @@
                 <a:pt x="45720" y="0"/>
               </a:moveTo>
               <a:lnTo>
-                <a:pt x="45720" y="292224"/>
+                <a:pt x="45720" y="258105"/>
               </a:lnTo>
             </a:path>
           </a:pathLst>
@@ -2244,8 +2382,8 @@
       </dsp:nvSpPr>
       <dsp:spPr>
         <a:xfrm>
-          <a:off x="694" y="224219"/>
-          <a:ext cx="1391542" cy="695771"/>
+          <a:off x="475108" y="1548"/>
+          <a:ext cx="1229072" cy="614536"/>
         </a:xfrm>
         <a:prstGeom prst="rect">
           <a:avLst/>
@@ -2287,12 +2425,12 @@
         </a:fontRef>
       </dsp:style>
       <dsp:txBody>
-        <a:bodyPr spcFirstLastPara="0" vert="horz" wrap="square" lIns="13970" tIns="13970" rIns="13970" bIns="13970" numCol="1" spcCol="1270" anchor="ctr" anchorCtr="0">
+        <a:bodyPr spcFirstLastPara="0" vert="horz" wrap="square" lIns="12065" tIns="12065" rIns="12065" bIns="12065" numCol="1" spcCol="1270" anchor="ctr" anchorCtr="0">
           <a:noAutofit/>
         </a:bodyPr>
         <a:lstStyle/>
         <a:p>
-          <a:pPr marL="0" lvl="0" indent="0" algn="ctr" defTabSz="977900">
+          <a:pPr marL="0" lvl="0" indent="0" algn="ctr" defTabSz="844550">
             <a:lnSpc>
               <a:spcPct val="90000"/>
             </a:lnSpc>
@@ -2305,15 +2443,15 @@
             <a:buNone/>
           </a:pPr>
           <a:r>
-            <a:rPr lang="en-US" sz="2200" b="1" kern="1200"/>
+            <a:rPr lang="en-US" sz="1900" b="1" kern="1200"/>
             <a:t>Bowl</a:t>
           </a:r>
-          <a:endParaRPr lang="en-US" sz="2200" kern="1200"/>
+          <a:endParaRPr lang="en-US" sz="1900" kern="1200"/>
         </a:p>
       </dsp:txBody>
       <dsp:txXfrm>
-        <a:off x="694" y="224219"/>
-        <a:ext cx="1391542" cy="695771"/>
+        <a:off x="475108" y="1548"/>
+        <a:ext cx="1229072" cy="614536"/>
       </dsp:txXfrm>
     </dsp:sp>
     <dsp:sp modelId="{472C4FA7-2A62-4D2B-9BA0-5177280A9E4D}">
@@ -2323,8 +2461,8 @@
       </dsp:nvSpPr>
       <dsp:spPr>
         <a:xfrm>
-          <a:off x="694" y="1212215"/>
-          <a:ext cx="1391542" cy="695771"/>
+          <a:off x="475108" y="874189"/>
+          <a:ext cx="1229072" cy="614536"/>
         </a:xfrm>
         <a:prstGeom prst="rect">
           <a:avLst/>
@@ -2366,12 +2504,12 @@
         </a:fontRef>
       </dsp:style>
       <dsp:txBody>
-        <a:bodyPr spcFirstLastPara="0" vert="horz" wrap="square" lIns="13970" tIns="13970" rIns="13970" bIns="13970" numCol="1" spcCol="1270" anchor="ctr" anchorCtr="0">
+        <a:bodyPr spcFirstLastPara="0" vert="horz" wrap="square" lIns="12065" tIns="12065" rIns="12065" bIns="12065" numCol="1" spcCol="1270" anchor="ctr" anchorCtr="0">
           <a:noAutofit/>
         </a:bodyPr>
         <a:lstStyle/>
         <a:p>
-          <a:pPr marL="0" lvl="0" indent="0" algn="ctr" defTabSz="977900">
+          <a:pPr marL="0" lvl="0" indent="0" algn="ctr" defTabSz="844550">
             <a:lnSpc>
               <a:spcPct val="90000"/>
             </a:lnSpc>
@@ -2384,14 +2522,14 @@
             <a:buNone/>
           </a:pPr>
           <a:r>
-            <a:rPr lang="en-US" sz="2200" b="1" kern="1200" dirty="0"/>
+            <a:rPr lang="en-US" sz="1900" b="1" kern="1200" dirty="0"/>
             <a:t>All lines of text</a:t>
           </a:r>
         </a:p>
       </dsp:txBody>
       <dsp:txXfrm>
-        <a:off x="694" y="1212215"/>
-        <a:ext cx="1391542" cy="695771"/>
+        <a:off x="475108" y="874189"/>
+        <a:ext cx="1229072" cy="614536"/>
       </dsp:txXfrm>
     </dsp:sp>
     <dsp:sp modelId="{89B1CE02-AAD0-44D6-B3CF-39BDDDEFA1D4}">
@@ -2401,8 +2539,8 @@
       </dsp:nvSpPr>
       <dsp:spPr>
         <a:xfrm>
-          <a:off x="1684461" y="224219"/>
-          <a:ext cx="1391542" cy="695771"/>
+          <a:off x="1962286" y="1548"/>
+          <a:ext cx="1229072" cy="614536"/>
         </a:xfrm>
         <a:prstGeom prst="rect">
           <a:avLst/>
@@ -2444,12 +2582,12 @@
         </a:fontRef>
       </dsp:style>
       <dsp:txBody>
-        <a:bodyPr spcFirstLastPara="0" vert="horz" wrap="square" lIns="13970" tIns="13970" rIns="13970" bIns="13970" numCol="1" spcCol="1270" anchor="ctr" anchorCtr="0">
+        <a:bodyPr spcFirstLastPara="0" vert="horz" wrap="square" lIns="12065" tIns="12065" rIns="12065" bIns="12065" numCol="1" spcCol="1270" anchor="ctr" anchorCtr="0">
           <a:noAutofit/>
         </a:bodyPr>
         <a:lstStyle/>
         <a:p>
-          <a:pPr marL="0" lvl="0" indent="0" algn="ctr" defTabSz="977900">
+          <a:pPr marL="0" lvl="0" indent="0" algn="ctr" defTabSz="844550">
             <a:lnSpc>
               <a:spcPct val="90000"/>
             </a:lnSpc>
@@ -2462,14 +2600,14 @@
             <a:buNone/>
           </a:pPr>
           <a:r>
-            <a:rPr lang="en-US" sz="2200" b="1" kern="1200" dirty="0"/>
+            <a:rPr lang="en-US" sz="1900" b="1" kern="1200" dirty="0"/>
             <a:t>Noodles</a:t>
           </a:r>
         </a:p>
       </dsp:txBody>
       <dsp:txXfrm>
-        <a:off x="1684461" y="224219"/>
-        <a:ext cx="1391542" cy="695771"/>
+        <a:off x="1962286" y="1548"/>
+        <a:ext cx="1229072" cy="614536"/>
       </dsp:txXfrm>
     </dsp:sp>
     <dsp:sp modelId="{65938371-8F79-4B9F-A992-0E6CDC0ED4C3}">
@@ -2479,8 +2617,8 @@
       </dsp:nvSpPr>
       <dsp:spPr>
         <a:xfrm>
-          <a:off x="1684461" y="1212215"/>
-          <a:ext cx="1391542" cy="695771"/>
+          <a:off x="1962286" y="874189"/>
+          <a:ext cx="1229072" cy="614536"/>
         </a:xfrm>
         <a:prstGeom prst="rect">
           <a:avLst/>
@@ -2522,12 +2660,12 @@
         </a:fontRef>
       </dsp:style>
       <dsp:txBody>
-        <a:bodyPr spcFirstLastPara="0" vert="horz" wrap="square" lIns="13970" tIns="13970" rIns="13970" bIns="13970" numCol="1" spcCol="1270" anchor="ctr" anchorCtr="0">
+        <a:bodyPr spcFirstLastPara="0" vert="horz" wrap="square" lIns="12065" tIns="12065" rIns="12065" bIns="12065" numCol="1" spcCol="1270" anchor="ctr" anchorCtr="0">
           <a:noAutofit/>
         </a:bodyPr>
         <a:lstStyle/>
         <a:p>
-          <a:pPr marL="0" lvl="0" indent="0" algn="ctr" defTabSz="977900">
+          <a:pPr marL="0" lvl="0" indent="0" algn="ctr" defTabSz="844550">
             <a:lnSpc>
               <a:spcPct val="90000"/>
             </a:lnSpc>
@@ -2540,14 +2678,14 @@
             <a:buNone/>
           </a:pPr>
           <a:r>
-            <a:rPr lang="en-US" sz="2200" b="1" kern="1200" dirty="0"/>
+            <a:rPr lang="en-US" sz="1900" b="1" kern="1200" dirty="0"/>
             <a:t>1 Line of text</a:t>
           </a:r>
         </a:p>
       </dsp:txBody>
       <dsp:txXfrm>
-        <a:off x="1684461" y="1212215"/>
-        <a:ext cx="1391542" cy="695771"/>
+        <a:off x="1962286" y="874189"/>
+        <a:ext cx="1229072" cy="614536"/>
       </dsp:txXfrm>
     </dsp:sp>
     <dsp:sp modelId="{76337CE2-C862-4456-B13C-F7EA8DD019F5}">
@@ -2557,8 +2695,8 @@
       </dsp:nvSpPr>
       <dsp:spPr>
         <a:xfrm>
-          <a:off x="4210112" y="224219"/>
-          <a:ext cx="1391542" cy="695771"/>
+          <a:off x="4193052" y="1548"/>
+          <a:ext cx="1229072" cy="614536"/>
         </a:xfrm>
         <a:prstGeom prst="rect">
           <a:avLst/>
@@ -2600,12 +2738,12 @@
         </a:fontRef>
       </dsp:style>
       <dsp:txBody>
-        <a:bodyPr spcFirstLastPara="0" vert="horz" wrap="square" lIns="13970" tIns="13970" rIns="13970" bIns="13970" numCol="1" spcCol="1270" anchor="ctr" anchorCtr="0">
+        <a:bodyPr spcFirstLastPara="0" vert="horz" wrap="square" lIns="12065" tIns="12065" rIns="12065" bIns="12065" numCol="1" spcCol="1270" anchor="ctr" anchorCtr="0">
           <a:noAutofit/>
         </a:bodyPr>
         <a:lstStyle/>
         <a:p>
-          <a:pPr marL="0" lvl="0" indent="0" algn="ctr" defTabSz="977900">
+          <a:pPr marL="0" lvl="0" indent="0" algn="ctr" defTabSz="844550">
             <a:lnSpc>
               <a:spcPct val="90000"/>
             </a:lnSpc>
@@ -2618,25 +2756,25 @@
             <a:buNone/>
           </a:pPr>
           <a:r>
-            <a:rPr lang="en-US" sz="2200" b="1" kern="1200" dirty="0"/>
+            <a:rPr lang="en-US" sz="1900" b="1" kern="1200" dirty="0"/>
             <a:t>Boiler</a:t>
           </a:r>
         </a:p>
       </dsp:txBody>
       <dsp:txXfrm>
-        <a:off x="4210112" y="224219"/>
-        <a:ext cx="1391542" cy="695771"/>
+        <a:off x="4193052" y="1548"/>
+        <a:ext cx="1229072" cy="614536"/>
       </dsp:txXfrm>
     </dsp:sp>
-    <dsp:sp modelId="{86BD5765-A2F6-48A1-B7F5-45B15109904D}">
+    <dsp:sp modelId="{034FA45F-AE35-4F9E-B7AE-D58AC0DDD34B}">
       <dsp:nvSpPr>
         <dsp:cNvPr id="0" name=""/>
         <dsp:cNvSpPr/>
       </dsp:nvSpPr>
       <dsp:spPr>
         <a:xfrm>
-          <a:off x="3368228" y="1212215"/>
-          <a:ext cx="1391542" cy="695771"/>
+          <a:off x="3449463" y="874189"/>
+          <a:ext cx="1229072" cy="614536"/>
         </a:xfrm>
         <a:prstGeom prst="rect">
           <a:avLst/>
@@ -2678,12 +2816,12 @@
         </a:fontRef>
       </dsp:style>
       <dsp:txBody>
-        <a:bodyPr spcFirstLastPara="0" vert="horz" wrap="square" lIns="13970" tIns="13970" rIns="13970" bIns="13970" numCol="1" spcCol="1270" anchor="ctr" anchorCtr="0">
+        <a:bodyPr spcFirstLastPara="0" vert="horz" wrap="square" lIns="12065" tIns="12065" rIns="12065" bIns="12065" numCol="1" spcCol="1270" anchor="ctr" anchorCtr="0">
           <a:noAutofit/>
         </a:bodyPr>
         <a:lstStyle/>
         <a:p>
-          <a:pPr marL="0" lvl="0" indent="0" algn="ctr" defTabSz="977900">
+          <a:pPr marL="0" lvl="0" indent="0" algn="ctr" defTabSz="844550">
             <a:lnSpc>
               <a:spcPct val="90000"/>
             </a:lnSpc>
@@ -2696,25 +2834,25 @@
             <a:buNone/>
           </a:pPr>
           <a:r>
-            <a:rPr lang="en-US" sz="2200" b="1" kern="1200" dirty="0"/>
-            <a:t>Parts of the line of text</a:t>
+            <a:rPr lang="en-US" sz="1900" b="1" kern="1200" dirty="0"/>
+            <a:t>Strainer</a:t>
           </a:r>
         </a:p>
       </dsp:txBody>
       <dsp:txXfrm>
-        <a:off x="3368228" y="1212215"/>
-        <a:ext cx="1391542" cy="695771"/>
+        <a:off x="3449463" y="874189"/>
+        <a:ext cx="1229072" cy="614536"/>
       </dsp:txXfrm>
     </dsp:sp>
-    <dsp:sp modelId="{62AF5118-178A-4A2E-AB5F-87CEC64655D8}">
+    <dsp:sp modelId="{86BD5765-A2F6-48A1-B7F5-45B15109904D}">
       <dsp:nvSpPr>
         <dsp:cNvPr id="0" name=""/>
         <dsp:cNvSpPr/>
       </dsp:nvSpPr>
       <dsp:spPr>
         <a:xfrm>
-          <a:off x="3716114" y="2200211"/>
-          <a:ext cx="1391542" cy="695771"/>
+          <a:off x="3449463" y="1746830"/>
+          <a:ext cx="1229072" cy="614536"/>
         </a:xfrm>
         <a:prstGeom prst="rect">
           <a:avLst/>
@@ -2756,12 +2894,12 @@
         </a:fontRef>
       </dsp:style>
       <dsp:txBody>
-        <a:bodyPr spcFirstLastPara="0" vert="horz" wrap="square" lIns="13970" tIns="13970" rIns="13970" bIns="13970" numCol="1" spcCol="1270" anchor="ctr" anchorCtr="0">
+        <a:bodyPr spcFirstLastPara="0" vert="horz" wrap="square" lIns="12065" tIns="12065" rIns="12065" bIns="12065" numCol="1" spcCol="1270" anchor="ctr" anchorCtr="0">
           <a:noAutofit/>
         </a:bodyPr>
         <a:lstStyle/>
         <a:p>
-          <a:pPr marL="0" lvl="0" indent="0" algn="ctr" defTabSz="977900">
+          <a:pPr marL="0" lvl="0" indent="0" algn="ctr" defTabSz="844550">
             <a:lnSpc>
               <a:spcPct val="90000"/>
             </a:lnSpc>
@@ -2774,31 +2912,31 @@
             <a:buNone/>
           </a:pPr>
           <a:r>
-            <a:rPr lang="en-US" sz="2200" b="1" kern="1200" dirty="0"/>
-            <a:t>Sauce</a:t>
+            <a:rPr lang="en-US" sz="1900" b="1" kern="1200" dirty="0"/>
+            <a:t>Parts of the line of text</a:t>
           </a:r>
         </a:p>
       </dsp:txBody>
       <dsp:txXfrm>
-        <a:off x="3716114" y="2200211"/>
-        <a:ext cx="1391542" cy="695771"/>
+        <a:off x="3449463" y="1746830"/>
+        <a:ext cx="1229072" cy="614536"/>
       </dsp:txXfrm>
     </dsp:sp>
-    <dsp:sp modelId="{9E0BECA6-6FDD-492A-B2E9-D33DD043F84D}">
+    <dsp:sp modelId="{62AF5118-178A-4A2E-AB5F-87CEC64655D8}">
       <dsp:nvSpPr>
         <dsp:cNvPr id="0" name=""/>
         <dsp:cNvSpPr/>
       </dsp:nvSpPr>
       <dsp:spPr>
         <a:xfrm>
-          <a:off x="3716114" y="3188206"/>
-          <a:ext cx="1391542" cy="695771"/>
+          <a:off x="3756731" y="2619472"/>
+          <a:ext cx="1229072" cy="614536"/>
         </a:xfrm>
         <a:prstGeom prst="rect">
           <a:avLst/>
         </a:prstGeom>
         <a:solidFill>
-          <a:schemeClr val="accent6">
+          <a:schemeClr val="accent1">
             <a:hueOff val="0"/>
             <a:satOff val="0"/>
             <a:lumOff val="0"/>
@@ -2834,12 +2972,12 @@
         </a:fontRef>
       </dsp:style>
       <dsp:txBody>
-        <a:bodyPr spcFirstLastPara="0" vert="horz" wrap="square" lIns="13970" tIns="13970" rIns="13970" bIns="13970" numCol="1" spcCol="1270" anchor="ctr" anchorCtr="0">
+        <a:bodyPr spcFirstLastPara="0" vert="horz" wrap="square" lIns="12065" tIns="12065" rIns="12065" bIns="12065" numCol="1" spcCol="1270" anchor="ctr" anchorCtr="0">
           <a:noAutofit/>
         </a:bodyPr>
         <a:lstStyle/>
         <a:p>
-          <a:pPr marL="0" lvl="0" indent="0" algn="ctr" defTabSz="977900">
+          <a:pPr marL="0" lvl="0" indent="0" algn="ctr" defTabSz="844550">
             <a:lnSpc>
               <a:spcPct val="90000"/>
             </a:lnSpc>
@@ -2852,14 +2990,92 @@
             <a:buNone/>
           </a:pPr>
           <a:r>
-            <a:rPr lang="en-US" sz="2200" b="1" kern="1200" dirty="0"/>
+            <a:rPr lang="en-US" sz="1900" b="1" kern="1200" dirty="0"/>
+            <a:t>Sauce</a:t>
+          </a:r>
+        </a:p>
+      </dsp:txBody>
+      <dsp:txXfrm>
+        <a:off x="3756731" y="2619472"/>
+        <a:ext cx="1229072" cy="614536"/>
+      </dsp:txXfrm>
+    </dsp:sp>
+    <dsp:sp modelId="{9E0BECA6-6FDD-492A-B2E9-D33DD043F84D}">
+      <dsp:nvSpPr>
+        <dsp:cNvPr id="0" name=""/>
+        <dsp:cNvSpPr/>
+      </dsp:nvSpPr>
+      <dsp:spPr>
+        <a:xfrm>
+          <a:off x="3756731" y="3492113"/>
+          <a:ext cx="1229072" cy="614536"/>
+        </a:xfrm>
+        <a:prstGeom prst="rect">
+          <a:avLst/>
+        </a:prstGeom>
+        <a:solidFill>
+          <a:schemeClr val="accent1">
+            <a:hueOff val="0"/>
+            <a:satOff val="0"/>
+            <a:lumOff val="0"/>
+            <a:alphaOff val="0"/>
+          </a:schemeClr>
+        </a:solidFill>
+        <a:ln w="12700" cap="flat" cmpd="sng" algn="ctr">
+          <a:solidFill>
+            <a:schemeClr val="lt1">
+              <a:hueOff val="0"/>
+              <a:satOff val="0"/>
+              <a:lumOff val="0"/>
+              <a:alphaOff val="0"/>
+            </a:schemeClr>
+          </a:solidFill>
+          <a:prstDash val="solid"/>
+          <a:miter lim="800000"/>
+        </a:ln>
+        <a:effectLst/>
+      </dsp:spPr>
+      <dsp:style>
+        <a:lnRef idx="2">
+          <a:scrgbClr r="0" g="0" b="0"/>
+        </a:lnRef>
+        <a:fillRef idx="1">
+          <a:scrgbClr r="0" g="0" b="0"/>
+        </a:fillRef>
+        <a:effectRef idx="0">
+          <a:scrgbClr r="0" g="0" b="0"/>
+        </a:effectRef>
+        <a:fontRef idx="minor">
+          <a:schemeClr val="lt1"/>
+        </a:fontRef>
+      </dsp:style>
+      <dsp:txBody>
+        <a:bodyPr spcFirstLastPara="0" vert="horz" wrap="square" lIns="12065" tIns="12065" rIns="12065" bIns="12065" numCol="1" spcCol="1270" anchor="ctr" anchorCtr="0">
+          <a:noAutofit/>
+        </a:bodyPr>
+        <a:lstStyle/>
+        <a:p>
+          <a:pPr marL="0" lvl="0" indent="0" algn="ctr" defTabSz="844550">
+            <a:lnSpc>
+              <a:spcPct val="90000"/>
+            </a:lnSpc>
+            <a:spcBef>
+              <a:spcPct val="0"/>
+            </a:spcBef>
+            <a:spcAft>
+              <a:spcPct val="35000"/>
+            </a:spcAft>
+            <a:buNone/>
+          </a:pPr>
+          <a:r>
+            <a:rPr lang="en-US" sz="1900" b="1" kern="1200" dirty="0"/>
             <a:t>Cheese</a:t>
           </a:r>
         </a:p>
       </dsp:txBody>
       <dsp:txXfrm>
-        <a:off x="3716114" y="3188206"/>
-        <a:ext cx="1391542" cy="695771"/>
+        <a:off x="3756731" y="3492113"/>
+        <a:ext cx="1229072" cy="614536"/>
       </dsp:txXfrm>
     </dsp:sp>
     <dsp:sp modelId="{3816A5CC-BEB8-48EC-81BF-8E885B64C6DD}">
@@ -2869,8 +3085,8 @@
       </dsp:nvSpPr>
       <dsp:spPr>
         <a:xfrm>
-          <a:off x="5051995" y="1212215"/>
-          <a:ext cx="1391542" cy="695771"/>
+          <a:off x="4936641" y="874189"/>
+          <a:ext cx="1229072" cy="614536"/>
         </a:xfrm>
         <a:prstGeom prst="rect">
           <a:avLst/>
@@ -2912,12 +3128,12 @@
         </a:fontRef>
       </dsp:style>
       <dsp:txBody>
-        <a:bodyPr spcFirstLastPara="0" vert="horz" wrap="square" lIns="13970" tIns="13970" rIns="13970" bIns="13970" numCol="1" spcCol="1270" anchor="ctr" anchorCtr="0">
+        <a:bodyPr spcFirstLastPara="0" vert="horz" wrap="square" lIns="12065" tIns="12065" rIns="12065" bIns="12065" numCol="1" spcCol="1270" anchor="ctr" anchorCtr="0">
           <a:noAutofit/>
         </a:bodyPr>
         <a:lstStyle/>
         <a:p>
-          <a:pPr marL="0" lvl="0" indent="0" algn="ctr" defTabSz="977900">
+          <a:pPr marL="0" lvl="0" indent="0" algn="ctr" defTabSz="844550">
             <a:lnSpc>
               <a:spcPct val="90000"/>
             </a:lnSpc>
@@ -2930,14 +3146,14 @@
             <a:buNone/>
           </a:pPr>
           <a:r>
-            <a:rPr lang="en-US" sz="2200" b="1" kern="1200" dirty="0"/>
+            <a:rPr lang="en-US" sz="1900" b="1" kern="1200" dirty="0"/>
             <a:t>Styling</a:t>
           </a:r>
         </a:p>
       </dsp:txBody>
       <dsp:txXfrm>
-        <a:off x="5051995" y="1212215"/>
-        <a:ext cx="1391542" cy="695771"/>
+        <a:off x="4936641" y="874189"/>
+        <a:ext cx="1229072" cy="614536"/>
       </dsp:txXfrm>
     </dsp:sp>
     <dsp:sp modelId="{E49F3485-8B07-4666-9706-942325754F7F}">
@@ -2947,8 +3163,8 @@
       </dsp:nvSpPr>
       <dsp:spPr>
         <a:xfrm>
-          <a:off x="6735762" y="224219"/>
-          <a:ext cx="1391542" cy="695771"/>
+          <a:off x="6423818" y="1548"/>
+          <a:ext cx="1229072" cy="614536"/>
         </a:xfrm>
         <a:prstGeom prst="rect">
           <a:avLst/>
@@ -2990,12 +3206,12 @@
         </a:fontRef>
       </dsp:style>
       <dsp:txBody>
-        <a:bodyPr spcFirstLastPara="0" vert="horz" wrap="square" lIns="13970" tIns="13970" rIns="13970" bIns="13970" numCol="1" spcCol="1270" anchor="ctr" anchorCtr="0">
+        <a:bodyPr spcFirstLastPara="0" vert="horz" wrap="square" lIns="12065" tIns="12065" rIns="12065" bIns="12065" numCol="1" spcCol="1270" anchor="ctr" anchorCtr="0">
           <a:noAutofit/>
         </a:bodyPr>
         <a:lstStyle/>
         <a:p>
-          <a:pPr marL="0" lvl="0" indent="0" algn="ctr" defTabSz="977900">
+          <a:pPr marL="0" lvl="0" indent="0" algn="ctr" defTabSz="844550">
             <a:lnSpc>
               <a:spcPct val="90000"/>
             </a:lnSpc>
@@ -3008,14 +3224,14 @@
             <a:buNone/>
           </a:pPr>
           <a:r>
-            <a:rPr lang="en-US" sz="2200" b="1" kern="1200" dirty="0"/>
+            <a:rPr lang="en-US" sz="1900" b="1" kern="1200" dirty="0"/>
             <a:t>Plate</a:t>
           </a:r>
         </a:p>
       </dsp:txBody>
       <dsp:txXfrm>
-        <a:off x="6735762" y="224219"/>
-        <a:ext cx="1391542" cy="695771"/>
+        <a:off x="6423818" y="1548"/>
+        <a:ext cx="1229072" cy="614536"/>
       </dsp:txXfrm>
     </dsp:sp>
     <dsp:sp modelId="{DE1AE636-A532-4298-AC12-335967E92665}">
@@ -3025,8 +3241,8 @@
       </dsp:nvSpPr>
       <dsp:spPr>
         <a:xfrm>
-          <a:off x="6735762" y="1212215"/>
-          <a:ext cx="1391542" cy="695771"/>
+          <a:off x="6423818" y="874189"/>
+          <a:ext cx="1229072" cy="614536"/>
         </a:xfrm>
         <a:prstGeom prst="rect">
           <a:avLst/>
@@ -3068,12 +3284,12 @@
         </a:fontRef>
       </dsp:style>
       <dsp:txBody>
-        <a:bodyPr spcFirstLastPara="0" vert="horz" wrap="square" lIns="13970" tIns="13970" rIns="13970" bIns="13970" numCol="1" spcCol="1270" anchor="ctr" anchorCtr="0">
+        <a:bodyPr spcFirstLastPara="0" vert="horz" wrap="square" lIns="12065" tIns="12065" rIns="12065" bIns="12065" numCol="1" spcCol="1270" anchor="ctr" anchorCtr="0">
           <a:noAutofit/>
         </a:bodyPr>
         <a:lstStyle/>
         <a:p>
-          <a:pPr marL="0" lvl="0" indent="0" algn="ctr" defTabSz="977900">
+          <a:pPr marL="0" lvl="0" indent="0" algn="ctr" defTabSz="844550">
             <a:lnSpc>
               <a:spcPct val="90000"/>
             </a:lnSpc>
@@ -3086,14 +3302,14 @@
             <a:buNone/>
           </a:pPr>
           <a:r>
-            <a:rPr lang="en-US" sz="2200" b="1" kern="1200" dirty="0"/>
+            <a:rPr lang="en-US" sz="1900" b="1" kern="1200" dirty="0"/>
             <a:t>Output formatting </a:t>
           </a:r>
         </a:p>
       </dsp:txBody>
       <dsp:txXfrm>
-        <a:off x="6735762" y="1212215"/>
-        <a:ext cx="1391542" cy="695771"/>
+        <a:off x="6423818" y="874189"/>
+        <a:ext cx="1229072" cy="614536"/>
       </dsp:txXfrm>
     </dsp:sp>
   </dsp:spTree>
@@ -5427,7 +5643,7 @@
           <a:p>
             <a:fld id="{85AE3D23-EC8F-4E43-9ECF-905EF06F1874}" type="datetimeFigureOut">
               <a:rPr lang="en-US" smtClean="0"/>
-              <a:t>2/3/2022</a:t>
+              <a:t>2/4/2022</a:t>
             </a:fld>
             <a:endParaRPr lang="en-US"/>
           </a:p>
@@ -5625,7 +5841,7 @@
           <a:p>
             <a:fld id="{85AE3D23-EC8F-4E43-9ECF-905EF06F1874}" type="datetimeFigureOut">
               <a:rPr lang="en-US" smtClean="0"/>
-              <a:t>2/3/2022</a:t>
+              <a:t>2/4/2022</a:t>
             </a:fld>
             <a:endParaRPr lang="en-US"/>
           </a:p>
@@ -5833,7 +6049,7 @@
           <a:p>
             <a:fld id="{85AE3D23-EC8F-4E43-9ECF-905EF06F1874}" type="datetimeFigureOut">
               <a:rPr lang="en-US" smtClean="0"/>
-              <a:t>2/3/2022</a:t>
+              <a:t>2/4/2022</a:t>
             </a:fld>
             <a:endParaRPr lang="en-US"/>
           </a:p>
@@ -6031,7 +6247,7 @@
           <a:p>
             <a:fld id="{85AE3D23-EC8F-4E43-9ECF-905EF06F1874}" type="datetimeFigureOut">
               <a:rPr lang="en-US" smtClean="0"/>
-              <a:t>2/3/2022</a:t>
+              <a:t>2/4/2022</a:t>
             </a:fld>
             <a:endParaRPr lang="en-US"/>
           </a:p>
@@ -6306,7 +6522,7 @@
           <a:p>
             <a:fld id="{85AE3D23-EC8F-4E43-9ECF-905EF06F1874}" type="datetimeFigureOut">
               <a:rPr lang="en-US" smtClean="0"/>
-              <a:t>2/3/2022</a:t>
+              <a:t>2/4/2022</a:t>
             </a:fld>
             <a:endParaRPr lang="en-US"/>
           </a:p>
@@ -6571,7 +6787,7 @@
           <a:p>
             <a:fld id="{85AE3D23-EC8F-4E43-9ECF-905EF06F1874}" type="datetimeFigureOut">
               <a:rPr lang="en-US" smtClean="0"/>
-              <a:t>2/3/2022</a:t>
+              <a:t>2/4/2022</a:t>
             </a:fld>
             <a:endParaRPr lang="en-US"/>
           </a:p>
@@ -6983,7 +7199,7 @@
           <a:p>
             <a:fld id="{85AE3D23-EC8F-4E43-9ECF-905EF06F1874}" type="datetimeFigureOut">
               <a:rPr lang="en-US" smtClean="0"/>
-              <a:t>2/3/2022</a:t>
+              <a:t>2/4/2022</a:t>
             </a:fld>
             <a:endParaRPr lang="en-US"/>
           </a:p>
@@ -7124,7 +7340,7 @@
           <a:p>
             <a:fld id="{85AE3D23-EC8F-4E43-9ECF-905EF06F1874}" type="datetimeFigureOut">
               <a:rPr lang="en-US" smtClean="0"/>
-              <a:t>2/3/2022</a:t>
+              <a:t>2/4/2022</a:t>
             </a:fld>
             <a:endParaRPr lang="en-US"/>
           </a:p>
@@ -7237,7 +7453,7 @@
           <a:p>
             <a:fld id="{85AE3D23-EC8F-4E43-9ECF-905EF06F1874}" type="datetimeFigureOut">
               <a:rPr lang="en-US" smtClean="0"/>
-              <a:t>2/3/2022</a:t>
+              <a:t>2/4/2022</a:t>
             </a:fld>
             <a:endParaRPr lang="en-US"/>
           </a:p>
@@ -7548,7 +7764,7 @@
           <a:p>
             <a:fld id="{85AE3D23-EC8F-4E43-9ECF-905EF06F1874}" type="datetimeFigureOut">
               <a:rPr lang="en-US" smtClean="0"/>
-              <a:t>2/3/2022</a:t>
+              <a:t>2/4/2022</a:t>
             </a:fld>
             <a:endParaRPr lang="en-US"/>
           </a:p>
@@ -7836,7 +8052,7 @@
           <a:p>
             <a:fld id="{85AE3D23-EC8F-4E43-9ECF-905EF06F1874}" type="datetimeFigureOut">
               <a:rPr lang="en-US" smtClean="0"/>
-              <a:t>2/3/2022</a:t>
+              <a:t>2/4/2022</a:t>
             </a:fld>
             <a:endParaRPr lang="en-US"/>
           </a:p>
@@ -8077,7 +8293,7 @@
           <a:p>
             <a:fld id="{85AE3D23-EC8F-4E43-9ECF-905EF06F1874}" type="datetimeFigureOut">
               <a:rPr lang="en-US" smtClean="0"/>
-              <a:t>2/3/2022</a:t>
+              <a:t>2/4/2022</a:t>
             </a:fld>
             <a:endParaRPr lang="en-US"/>
           </a:p>
@@ -8593,7 +8809,7 @@
           <p:nvPr>
             <p:extLst>
               <p:ext uri="{D42A27DB-BD31-4B8C-83A1-F6EECF244321}">
-                <p14:modId xmlns:p14="http://schemas.microsoft.com/office/powerpoint/2010/main" val="2231638797"/>
+                <p14:modId xmlns:p14="http://schemas.microsoft.com/office/powerpoint/2010/main" val="2375074409"/>
               </p:ext>
             </p:extLst>
           </p:nvPr>

</xml_diff>